<commit_message>
Added comparative table for graphing tools
</commit_message>
<xml_diff>
--- a/swot.pptx
+++ b/swot.pptx
@@ -8,6 +8,7 @@
     <p:sldId id="256" r:id="rId2"/>
     <p:sldId id="257" r:id="rId3"/>
     <p:sldId id="258" r:id="rId4"/>
+    <p:sldId id="259" r:id="rId5"/>
   </p:sldIdLst>
   <p:sldSz cx="9144000" cy="6858000" type="screen4x3"/>
   <p:notesSz cx="6858000" cy="9144000"/>
@@ -16248,6 +16249,2925 @@
 </p:sld>
 </file>
 
+<file path=ppt/slides/slide4.xml><?xml version="1.0" encoding="utf-8"?>
+<p:sld xmlns:a="http://schemas.openxmlformats.org/drawingml/2006/main" xmlns:r="http://schemas.openxmlformats.org/officeDocument/2006/relationships" xmlns:p="http://schemas.openxmlformats.org/presentationml/2006/main">
+  <p:cSld>
+    <p:spTree>
+      <p:nvGrpSpPr>
+        <p:cNvPr id="1" name=""/>
+        <p:cNvGrpSpPr/>
+        <p:nvPr/>
+      </p:nvGrpSpPr>
+      <p:grpSpPr>
+        <a:xfrm>
+          <a:off x="0" y="0"/>
+          <a:ext cx="0" cy="0"/>
+          <a:chOff x="0" y="0"/>
+          <a:chExt cx="0" cy="0"/>
+        </a:xfrm>
+      </p:grpSpPr>
+      <p:graphicFrame>
+        <p:nvGraphicFramePr>
+          <p:cNvPr id="3" name="2 Tabla"/>
+          <p:cNvGraphicFramePr>
+            <a:graphicFrameLocks noGrp="1"/>
+          </p:cNvGraphicFramePr>
+          <p:nvPr>
+            <p:extLst>
+              <p:ext uri="{D42A27DB-BD31-4B8C-83A1-F6EECF244321}">
+                <p14:modId xmlns:p14="http://schemas.microsoft.com/office/powerpoint/2010/main" val="92673919"/>
+              </p:ext>
+            </p:extLst>
+          </p:nvPr>
+        </p:nvGraphicFramePr>
+        <p:xfrm>
+          <a:off x="685800" y="304800"/>
+          <a:ext cx="7848600" cy="6103924"/>
+        </p:xfrm>
+        <a:graphic>
+          <a:graphicData uri="http://schemas.openxmlformats.org/drawingml/2006/table">
+            <a:tbl>
+              <a:tblPr firstRow="1" bandRow="1">
+                <a:tableStyleId>{5C22544A-7EE6-4342-B048-85BDC9FD1C3A}</a:tableStyleId>
+              </a:tblPr>
+              <a:tblGrid>
+                <a:gridCol w="1371600"/>
+                <a:gridCol w="2971800"/>
+                <a:gridCol w="1752600"/>
+                <a:gridCol w="1752600"/>
+              </a:tblGrid>
+              <a:tr h="211642">
+                <a:tc>
+                  <a:txBody>
+                    <a:bodyPr/>
+                    <a:lstStyle/>
+                    <a:p>
+                      <a:pPr algn="ctr" fontAlgn="ctr"/>
+                      <a:r>
+                        <a:rPr lang="en-US" sz="1000" b="1" i="0" u="none" strike="noStrike" dirty="0">
+                          <a:solidFill>
+                            <a:srgbClr val="000000"/>
+                          </a:solidFill>
+                          <a:effectLst/>
+                          <a:latin typeface="Calibri"/>
+                        </a:rPr>
+                        <a:t>Name</a:t>
+                      </a:r>
+                    </a:p>
+                  </a:txBody>
+                  <a:tcPr marL="9525" marR="9525" marT="9525" marB="0" anchor="ctr"/>
+                </a:tc>
+                <a:tc>
+                  <a:txBody>
+                    <a:bodyPr/>
+                    <a:lstStyle/>
+                    <a:p>
+                      <a:pPr algn="ctr" fontAlgn="ctr"/>
+                      <a:r>
+                        <a:rPr lang="en-US" sz="1100" b="0" i="0" u="none" strike="noStrike" dirty="0">
+                          <a:solidFill>
+                            <a:schemeClr val="tx1"/>
+                          </a:solidFill>
+                          <a:effectLst/>
+                          <a:latin typeface="Calibri"/>
+                        </a:rPr>
+                        <a:t>​</a:t>
+                      </a:r>
+                      <a:r>
+                        <a:rPr lang="en-US" sz="1100" b="0" i="0" u="none" strike="noStrike" dirty="0" err="1">
+                          <a:solidFill>
+                            <a:schemeClr val="tx1"/>
+                          </a:solidFill>
+                          <a:effectLst/>
+                          <a:latin typeface="Calibri"/>
+                        </a:rPr>
+                        <a:t>JFreeChart</a:t>
+                      </a:r>
+                      <a:endParaRPr lang="en-US" sz="1100" b="0" i="0" u="none" strike="noStrike" dirty="0">
+                        <a:solidFill>
+                          <a:schemeClr val="tx1"/>
+                        </a:solidFill>
+                        <a:effectLst/>
+                        <a:latin typeface="Calibri"/>
+                      </a:endParaRPr>
+                    </a:p>
+                  </a:txBody>
+                  <a:tcPr marL="9525" marR="9525" marT="9525" marB="0" anchor="ctr"/>
+                </a:tc>
+                <a:tc>
+                  <a:txBody>
+                    <a:bodyPr/>
+                    <a:lstStyle/>
+                    <a:p>
+                      <a:pPr algn="ctr" fontAlgn="ctr"/>
+                      <a:r>
+                        <a:rPr lang="en-US" sz="1100" b="0" i="0" u="sng" strike="noStrike" dirty="0">
+                          <a:solidFill>
+                            <a:schemeClr val="tx1"/>
+                          </a:solidFill>
+                          <a:effectLst/>
+                          <a:latin typeface="Calibri"/>
+                        </a:rPr>
+                        <a:t>​jChart2D</a:t>
+                      </a:r>
+                    </a:p>
+                  </a:txBody>
+                  <a:tcPr marL="9525" marR="9525" marT="9525" marB="0" anchor="ctr"/>
+                </a:tc>
+                <a:tc>
+                  <a:txBody>
+                    <a:bodyPr/>
+                    <a:lstStyle/>
+                    <a:p>
+                      <a:pPr algn="ctr" fontAlgn="ctr"/>
+                      <a:r>
+                        <a:rPr lang="en-US" sz="1100" b="0" i="0" u="sng" strike="noStrike" dirty="0">
+                          <a:solidFill>
+                            <a:schemeClr val="tx1"/>
+                          </a:solidFill>
+                          <a:effectLst/>
+                          <a:latin typeface="Calibri"/>
+                        </a:rPr>
+                        <a:t>​</a:t>
+                      </a:r>
+                      <a:r>
+                        <a:rPr lang="en-US" sz="1100" b="0" i="0" u="sng" strike="noStrike" dirty="0" err="1" smtClean="0">
+                          <a:solidFill>
+                            <a:schemeClr val="tx1"/>
+                          </a:solidFill>
+                          <a:effectLst/>
+                          <a:latin typeface="Calibri"/>
+                        </a:rPr>
+                        <a:t>Xchar</a:t>
+                      </a:r>
+                      <a:endParaRPr lang="en-US" sz="1100" b="0" i="0" u="sng" strike="noStrike" dirty="0">
+                        <a:solidFill>
+                          <a:schemeClr val="tx1"/>
+                        </a:solidFill>
+                        <a:effectLst/>
+                        <a:latin typeface="Calibri"/>
+                      </a:endParaRPr>
+                    </a:p>
+                  </a:txBody>
+                  <a:tcPr marL="9525" marR="9525" marT="9525" marB="0" anchor="ctr"/>
+                </a:tc>
+              </a:tr>
+              <a:tr h="211642">
+                <a:tc>
+                  <a:txBody>
+                    <a:bodyPr/>
+                    <a:lstStyle/>
+                    <a:p>
+                      <a:pPr algn="ctr" fontAlgn="ctr"/>
+                      <a:r>
+                        <a:rPr lang="en-US" sz="1000" b="1" i="0" u="none" strike="noStrike" dirty="0">
+                          <a:solidFill>
+                            <a:srgbClr val="000000"/>
+                          </a:solidFill>
+                          <a:effectLst/>
+                          <a:latin typeface="Calibri"/>
+                        </a:rPr>
+                        <a:t>Latest release</a:t>
+                      </a:r>
+                    </a:p>
+                  </a:txBody>
+                  <a:tcPr marL="9525" marR="9525" marT="9525" marB="0" anchor="ctr">
+                    <a:solidFill>
+                      <a:schemeClr val="accent1"/>
+                    </a:solidFill>
+                  </a:tcPr>
+                </a:tc>
+                <a:tc>
+                  <a:txBody>
+                    <a:bodyPr/>
+                    <a:lstStyle/>
+                    <a:p>
+                      <a:pPr algn="ctr" fontAlgn="ctr"/>
+                      <a:r>
+                        <a:rPr lang="en-US" sz="1000" b="0" i="0" u="none" strike="noStrike" dirty="0">
+                          <a:solidFill>
+                            <a:srgbClr val="000000"/>
+                          </a:solidFill>
+                          <a:effectLst/>
+                          <a:latin typeface="Calibri"/>
+                        </a:rPr>
+                        <a:t>1.0.17 (November 2013)</a:t>
+                      </a:r>
+                    </a:p>
+                  </a:txBody>
+                  <a:tcPr marL="9525" marR="9525" marT="9525" marB="0" anchor="ctr"/>
+                </a:tc>
+                <a:tc>
+                  <a:txBody>
+                    <a:bodyPr/>
+                    <a:lstStyle/>
+                    <a:p>
+                      <a:pPr algn="ctr" fontAlgn="ctr"/>
+                      <a:r>
+                        <a:rPr lang="en-US" sz="1000" b="0" i="0" u="none" strike="noStrike">
+                          <a:solidFill>
+                            <a:srgbClr val="000000"/>
+                          </a:solidFill>
+                          <a:effectLst/>
+                          <a:latin typeface="Calibri"/>
+                        </a:rPr>
+                        <a:t>3.2.2 (September 2011)</a:t>
+                      </a:r>
+                    </a:p>
+                  </a:txBody>
+                  <a:tcPr marL="9525" marR="9525" marT="9525" marB="0" anchor="ctr"/>
+                </a:tc>
+                <a:tc>
+                  <a:txBody>
+                    <a:bodyPr/>
+                    <a:lstStyle/>
+                    <a:p>
+                      <a:pPr algn="ctr" fontAlgn="ctr"/>
+                      <a:r>
+                        <a:rPr lang="en-US" sz="1000" b="0" i="0" u="none" strike="noStrike">
+                          <a:solidFill>
+                            <a:srgbClr val="000000"/>
+                          </a:solidFill>
+                          <a:effectLst/>
+                          <a:latin typeface="Calibri"/>
+                        </a:rPr>
+                        <a:t>2.2.1 (July 2013)</a:t>
+                      </a:r>
+                    </a:p>
+                  </a:txBody>
+                  <a:tcPr marL="9525" marR="9525" marT="9525" marB="0" anchor="ctr"/>
+                </a:tc>
+              </a:tr>
+              <a:tr h="211642">
+                <a:tc>
+                  <a:txBody>
+                    <a:bodyPr/>
+                    <a:lstStyle/>
+                    <a:p>
+                      <a:pPr algn="ctr" fontAlgn="ctr"/>
+                      <a:r>
+                        <a:rPr lang="en-US" sz="1100" b="0" i="0" u="none" strike="noStrike" dirty="0">
+                          <a:solidFill>
+                            <a:schemeClr val="tx1"/>
+                          </a:solidFill>
+                          <a:effectLst/>
+                          <a:latin typeface="Calibri"/>
+                        </a:rPr>
+                        <a:t>License</a:t>
+                      </a:r>
+                    </a:p>
+                  </a:txBody>
+                  <a:tcPr marL="9525" marR="9525" marT="9525" marB="0" anchor="ctr">
+                    <a:solidFill>
+                      <a:schemeClr val="accent1"/>
+                    </a:solidFill>
+                  </a:tcPr>
+                </a:tc>
+                <a:tc>
+                  <a:txBody>
+                    <a:bodyPr/>
+                    <a:lstStyle/>
+                    <a:p>
+                      <a:pPr algn="ctr" fontAlgn="ctr"/>
+                      <a:r>
+                        <a:rPr lang="en-US" sz="1100" b="0" i="0" u="none" strike="noStrike" dirty="0">
+                          <a:solidFill>
+                            <a:schemeClr val="tx1"/>
+                          </a:solidFill>
+                          <a:effectLst/>
+                          <a:latin typeface="Calibri"/>
+                          <a:hlinkClick r:id="rId2"/>
+                        </a:rPr>
+                        <a:t>​</a:t>
+                      </a:r>
+                      <a:r>
+                        <a:rPr lang="en-US" sz="1100" b="0" i="0" u="none" strike="noStrike" dirty="0">
+                          <a:solidFill>
+                            <a:schemeClr val="tx1"/>
+                          </a:solidFill>
+                          <a:effectLst/>
+                          <a:latin typeface="Calibri"/>
+                        </a:rPr>
+                        <a:t>LGPLv2.1</a:t>
+                      </a:r>
+                    </a:p>
+                  </a:txBody>
+                  <a:tcPr marL="9525" marR="9525" marT="9525" marB="0" anchor="ctr"/>
+                </a:tc>
+                <a:tc>
+                  <a:txBody>
+                    <a:bodyPr/>
+                    <a:lstStyle/>
+                    <a:p>
+                      <a:pPr algn="ctr" fontAlgn="ctr"/>
+                      <a:r>
+                        <a:rPr lang="en-US" sz="1100" b="0" i="0" u="none" strike="noStrike" dirty="0">
+                          <a:solidFill>
+                            <a:schemeClr val="tx1"/>
+                          </a:solidFill>
+                          <a:effectLst/>
+                          <a:latin typeface="Calibri"/>
+                          <a:hlinkClick r:id="rId2"/>
+                        </a:rPr>
+                        <a:t>​</a:t>
+                      </a:r>
+                      <a:r>
+                        <a:rPr lang="en-US" sz="1100" b="0" i="0" u="none" strike="noStrike" dirty="0">
+                          <a:solidFill>
+                            <a:schemeClr val="tx1"/>
+                          </a:solidFill>
+                          <a:effectLst/>
+                          <a:latin typeface="Calibri"/>
+                        </a:rPr>
+                        <a:t>LGPLv2.1</a:t>
+                      </a:r>
+                    </a:p>
+                  </a:txBody>
+                  <a:tcPr marL="9525" marR="9525" marT="9525" marB="0" anchor="ctr"/>
+                </a:tc>
+                <a:tc>
+                  <a:txBody>
+                    <a:bodyPr/>
+                    <a:lstStyle/>
+                    <a:p>
+                      <a:pPr algn="ctr" fontAlgn="ctr"/>
+                      <a:r>
+                        <a:rPr lang="en-US" sz="1100" b="0" i="0" u="none" strike="noStrike" dirty="0">
+                          <a:solidFill>
+                            <a:schemeClr val="tx1"/>
+                          </a:solidFill>
+                          <a:effectLst/>
+                          <a:latin typeface="Calibri"/>
+                        </a:rPr>
+                        <a:t>​Apache License 2.0</a:t>
+                      </a:r>
+                    </a:p>
+                  </a:txBody>
+                  <a:tcPr marL="9525" marR="9525" marT="9525" marB="0" anchor="ctr"/>
+                </a:tc>
+              </a:tr>
+              <a:tr h="211642">
+                <a:tc>
+                  <a:txBody>
+                    <a:bodyPr/>
+                    <a:lstStyle/>
+                    <a:p>
+                      <a:pPr algn="ctr" fontAlgn="ctr"/>
+                      <a:r>
+                        <a:rPr lang="en-US" sz="1000" b="1" i="0" u="none" strike="noStrike" dirty="0">
+                          <a:solidFill>
+                            <a:srgbClr val="000000"/>
+                          </a:solidFill>
+                          <a:effectLst/>
+                          <a:latin typeface="Calibri"/>
+                        </a:rPr>
+                        <a:t>Library core [</a:t>
+                      </a:r>
+                      <a:r>
+                        <a:rPr lang="en-US" sz="1000" b="1" i="0" u="none" strike="noStrike" dirty="0" err="1">
+                          <a:solidFill>
+                            <a:srgbClr val="000000"/>
+                          </a:solidFill>
+                          <a:effectLst/>
+                          <a:latin typeface="Calibri"/>
+                        </a:rPr>
+                        <a:t>KiB</a:t>
+                      </a:r>
+                      <a:r>
+                        <a:rPr lang="en-US" sz="1000" b="1" i="0" u="none" strike="noStrike" dirty="0">
+                          <a:solidFill>
+                            <a:srgbClr val="000000"/>
+                          </a:solidFill>
+                          <a:effectLst/>
+                          <a:latin typeface="Calibri"/>
+                        </a:rPr>
+                        <a:t>]</a:t>
+                      </a:r>
+                    </a:p>
+                  </a:txBody>
+                  <a:tcPr marL="9525" marR="9525" marT="9525" marB="0" anchor="ctr">
+                    <a:solidFill>
+                      <a:schemeClr val="accent1"/>
+                    </a:solidFill>
+                  </a:tcPr>
+                </a:tc>
+                <a:tc>
+                  <a:txBody>
+                    <a:bodyPr/>
+                    <a:lstStyle/>
+                    <a:p>
+                      <a:pPr algn="ctr" fontAlgn="ctr"/>
+                      <a:r>
+                        <a:rPr lang="en-US" sz="1000" b="0" i="0" u="none" strike="noStrike" dirty="0">
+                          <a:solidFill>
+                            <a:srgbClr val="000000"/>
+                          </a:solidFill>
+                          <a:effectLst/>
+                          <a:latin typeface="Calibri"/>
+                        </a:rPr>
+                        <a:t>1508.3</a:t>
+                      </a:r>
+                    </a:p>
+                  </a:txBody>
+                  <a:tcPr marL="9525" marR="9525" marT="9525" marB="0" anchor="ctr"/>
+                </a:tc>
+                <a:tc>
+                  <a:txBody>
+                    <a:bodyPr/>
+                    <a:lstStyle/>
+                    <a:p>
+                      <a:pPr algn="ctr" fontAlgn="ctr"/>
+                      <a:r>
+                        <a:rPr lang="en-US" sz="1000" b="0" i="0" u="none" strike="noStrike">
+                          <a:solidFill>
+                            <a:srgbClr val="000000"/>
+                          </a:solidFill>
+                          <a:effectLst/>
+                          <a:latin typeface="Calibri"/>
+                        </a:rPr>
+                        <a:t>465.9</a:t>
+                      </a:r>
+                    </a:p>
+                  </a:txBody>
+                  <a:tcPr marL="9525" marR="9525" marT="9525" marB="0" anchor="ctr"/>
+                </a:tc>
+                <a:tc>
+                  <a:txBody>
+                    <a:bodyPr/>
+                    <a:lstStyle/>
+                    <a:p>
+                      <a:pPr algn="ctr" fontAlgn="ctr"/>
+                      <a:r>
+                        <a:rPr lang="en-US" sz="1000" b="0" i="0" u="none" strike="noStrike">
+                          <a:solidFill>
+                            <a:srgbClr val="000000"/>
+                          </a:solidFill>
+                          <a:effectLst/>
+                          <a:latin typeface="Calibri"/>
+                        </a:rPr>
+                        <a:t>96.8</a:t>
+                      </a:r>
+                    </a:p>
+                  </a:txBody>
+                  <a:tcPr marL="9525" marR="9525" marT="9525" marB="0" anchor="ctr"/>
+                </a:tc>
+              </a:tr>
+              <a:tr h="601232">
+                <a:tc>
+                  <a:txBody>
+                    <a:bodyPr/>
+                    <a:lstStyle/>
+                    <a:p>
+                      <a:pPr algn="ctr" fontAlgn="ctr"/>
+                      <a:r>
+                        <a:rPr lang="en-US" sz="1000" b="1" i="0" u="none" strike="noStrike" dirty="0" smtClean="0">
+                          <a:solidFill>
+                            <a:srgbClr val="000000"/>
+                          </a:solidFill>
+                          <a:effectLst/>
+                          <a:latin typeface="Calibri"/>
+                        </a:rPr>
+                        <a:t>Dependencies</a:t>
+                      </a:r>
+                      <a:endParaRPr lang="en-US" sz="1000" b="1" i="0" u="none" strike="noStrike" dirty="0">
+                        <a:solidFill>
+                          <a:srgbClr val="000000"/>
+                        </a:solidFill>
+                        <a:effectLst/>
+                        <a:latin typeface="Calibri"/>
+                      </a:endParaRPr>
+                    </a:p>
+                  </a:txBody>
+                  <a:tcPr marL="9525" marR="9525" marT="9525" marB="0" anchor="ctr">
+                    <a:solidFill>
+                      <a:schemeClr val="accent1"/>
+                    </a:solidFill>
+                  </a:tcPr>
+                </a:tc>
+                <a:tc>
+                  <a:txBody>
+                    <a:bodyPr/>
+                    <a:lstStyle/>
+                    <a:p>
+                      <a:pPr algn="ctr" fontAlgn="ctr"/>
+                      <a:r>
+                        <a:rPr lang="en-US" sz="1000" b="0" i="0" u="none" strike="noStrike" dirty="0" err="1">
+                          <a:solidFill>
+                            <a:srgbClr val="000000"/>
+                          </a:solidFill>
+                          <a:effectLst/>
+                          <a:latin typeface="Calibri"/>
+                        </a:rPr>
+                        <a:t>hamcrest</a:t>
+                      </a:r>
+                      <a:r>
+                        <a:rPr lang="en-US" sz="1000" b="0" i="0" u="none" strike="noStrike" dirty="0">
+                          <a:solidFill>
+                            <a:srgbClr val="000000"/>
+                          </a:solidFill>
+                          <a:effectLst/>
+                          <a:latin typeface="Calibri"/>
+                        </a:rPr>
+                        <a:t>-core, </a:t>
+                      </a:r>
+                      <a:r>
+                        <a:rPr lang="en-US" sz="1000" b="0" i="0" u="none" strike="noStrike" dirty="0" err="1">
+                          <a:solidFill>
+                            <a:srgbClr val="000000"/>
+                          </a:solidFill>
+                          <a:effectLst/>
+                          <a:latin typeface="Calibri"/>
+                        </a:rPr>
+                        <a:t>jcommon</a:t>
+                      </a:r>
+                      <a:r>
+                        <a:rPr lang="en-US" sz="1000" b="0" i="0" u="none" strike="noStrike" dirty="0">
+                          <a:solidFill>
+                            <a:srgbClr val="000000"/>
+                          </a:solidFill>
+                          <a:effectLst/>
+                          <a:latin typeface="Calibri"/>
+                        </a:rPr>
+                        <a:t>, </a:t>
+                      </a:r>
+                      <a:r>
+                        <a:rPr lang="en-US" sz="1000" b="0" i="0" u="none" strike="noStrike" dirty="0" err="1">
+                          <a:solidFill>
+                            <a:srgbClr val="000000"/>
+                          </a:solidFill>
+                          <a:effectLst/>
+                          <a:latin typeface="Calibri"/>
+                        </a:rPr>
+                        <a:t>jfreechart</a:t>
+                      </a:r>
+                      <a:r>
+                        <a:rPr lang="en-US" sz="1000" b="0" i="0" u="none" strike="noStrike" dirty="0">
+                          <a:solidFill>
+                            <a:srgbClr val="000000"/>
+                          </a:solidFill>
+                          <a:effectLst/>
+                          <a:latin typeface="Calibri"/>
+                        </a:rPr>
+                        <a:t>-experimental, </a:t>
+                      </a:r>
+                      <a:r>
+                        <a:rPr lang="en-US" sz="1000" b="0" i="0" u="none" strike="noStrike" dirty="0" err="1">
+                          <a:solidFill>
+                            <a:srgbClr val="000000"/>
+                          </a:solidFill>
+                          <a:effectLst/>
+                          <a:latin typeface="Calibri"/>
+                        </a:rPr>
+                        <a:t>jfreechart-swt</a:t>
+                      </a:r>
+                      <a:r>
+                        <a:rPr lang="en-US" sz="1000" b="0" i="0" u="none" strike="noStrike" dirty="0">
+                          <a:solidFill>
+                            <a:srgbClr val="000000"/>
+                          </a:solidFill>
+                          <a:effectLst/>
+                          <a:latin typeface="Calibri"/>
+                        </a:rPr>
+                        <a:t>, </a:t>
+                      </a:r>
+                      <a:r>
+                        <a:rPr lang="en-US" sz="1000" b="0" i="0" u="none" strike="noStrike" dirty="0" err="1">
+                          <a:solidFill>
+                            <a:srgbClr val="000000"/>
+                          </a:solidFill>
+                          <a:effectLst/>
+                          <a:latin typeface="Calibri"/>
+                        </a:rPr>
+                        <a:t>jfreesvg</a:t>
+                      </a:r>
+                      <a:r>
+                        <a:rPr lang="en-US" sz="1000" b="0" i="0" u="none" strike="noStrike" dirty="0">
+                          <a:solidFill>
+                            <a:srgbClr val="000000"/>
+                          </a:solidFill>
+                          <a:effectLst/>
+                          <a:latin typeface="Calibri"/>
+                        </a:rPr>
+                        <a:t>, </a:t>
+                      </a:r>
+                      <a:r>
+                        <a:rPr lang="en-US" sz="1000" b="0" i="0" u="none" strike="noStrike" dirty="0" err="1">
+                          <a:solidFill>
+                            <a:srgbClr val="000000"/>
+                          </a:solidFill>
+                          <a:effectLst/>
+                          <a:latin typeface="Calibri"/>
+                        </a:rPr>
+                        <a:t>junit</a:t>
+                      </a:r>
+                      <a:r>
+                        <a:rPr lang="en-US" sz="1000" b="0" i="0" u="none" strike="noStrike" dirty="0">
+                          <a:solidFill>
+                            <a:srgbClr val="000000"/>
+                          </a:solidFill>
+                          <a:effectLst/>
+                          <a:latin typeface="Calibri"/>
+                        </a:rPr>
+                        <a:t>, </a:t>
+                      </a:r>
+                      <a:r>
+                        <a:rPr lang="en-US" sz="1000" b="0" i="0" u="none" strike="noStrike" dirty="0" err="1">
+                          <a:solidFill>
+                            <a:srgbClr val="000000"/>
+                          </a:solidFill>
+                          <a:effectLst/>
+                          <a:latin typeface="Calibri"/>
+                        </a:rPr>
+                        <a:t>orsoncharts</a:t>
+                      </a:r>
+                      <a:r>
+                        <a:rPr lang="en-US" sz="1000" b="0" i="0" u="none" strike="noStrike" dirty="0">
+                          <a:solidFill>
+                            <a:srgbClr val="000000"/>
+                          </a:solidFill>
+                          <a:effectLst/>
+                          <a:latin typeface="Calibri"/>
+                        </a:rPr>
+                        <a:t>, </a:t>
+                      </a:r>
+                      <a:r>
+                        <a:rPr lang="en-US" sz="1000" b="0" i="0" u="none" strike="noStrike" dirty="0" err="1">
+                          <a:solidFill>
+                            <a:srgbClr val="000000"/>
+                          </a:solidFill>
+                          <a:effectLst/>
+                          <a:latin typeface="Calibri"/>
+                        </a:rPr>
+                        <a:t>orsonpdf</a:t>
+                      </a:r>
+                      <a:r>
+                        <a:rPr lang="en-US" sz="1000" b="0" i="0" u="none" strike="noStrike" dirty="0">
+                          <a:solidFill>
+                            <a:srgbClr val="000000"/>
+                          </a:solidFill>
+                          <a:effectLst/>
+                          <a:latin typeface="Calibri"/>
+                        </a:rPr>
+                        <a:t>, servlet, </a:t>
+                      </a:r>
+                      <a:r>
+                        <a:rPr lang="en-US" sz="1000" b="0" i="0" u="none" strike="noStrike" dirty="0" smtClean="0">
+                          <a:solidFill>
+                            <a:srgbClr val="000000"/>
+                          </a:solidFill>
+                          <a:effectLst/>
+                          <a:latin typeface="Calibri"/>
+                        </a:rPr>
+                        <a:t>swtgraphics2d</a:t>
+                      </a:r>
+                      <a:endParaRPr lang="en-US" sz="1000" b="0" i="0" u="none" strike="noStrike" dirty="0">
+                        <a:solidFill>
+                          <a:srgbClr val="000000"/>
+                        </a:solidFill>
+                        <a:effectLst/>
+                        <a:latin typeface="Calibri"/>
+                      </a:endParaRPr>
+                    </a:p>
+                  </a:txBody>
+                  <a:tcPr marL="9525" marR="9525" marT="9525" marB="0" anchor="ctr"/>
+                </a:tc>
+                <a:tc>
+                  <a:txBody>
+                    <a:bodyPr/>
+                    <a:lstStyle/>
+                    <a:p>
+                      <a:pPr algn="ctr" fontAlgn="ctr"/>
+                      <a:r>
+                        <a:rPr lang="en-US" sz="1000" b="0" i="0" u="none" strike="noStrike" dirty="0" err="1">
+                          <a:solidFill>
+                            <a:srgbClr val="000000"/>
+                          </a:solidFill>
+                          <a:effectLst/>
+                          <a:latin typeface="Calibri"/>
+                        </a:rPr>
+                        <a:t>jide-oss</a:t>
+                      </a:r>
+                      <a:r>
+                        <a:rPr lang="en-US" sz="1000" b="0" i="0" u="none" strike="noStrike" dirty="0">
+                          <a:solidFill>
+                            <a:srgbClr val="000000"/>
+                          </a:solidFill>
+                          <a:effectLst/>
+                          <a:latin typeface="Calibri"/>
+                        </a:rPr>
+                        <a:t>, </a:t>
+                      </a:r>
+                      <a:r>
+                        <a:rPr lang="en-US" sz="1000" b="0" i="0" u="none" strike="noStrike" dirty="0" err="1" smtClean="0">
+                          <a:solidFill>
+                            <a:srgbClr val="000000"/>
+                          </a:solidFill>
+                          <a:effectLst/>
+                          <a:latin typeface="Calibri"/>
+                        </a:rPr>
+                        <a:t>xmlgraphics</a:t>
+                      </a:r>
+                      <a:r>
+                        <a:rPr lang="en-US" sz="1000" b="0" i="0" u="none" strike="noStrike" dirty="0" smtClean="0">
+                          <a:solidFill>
+                            <a:srgbClr val="000000"/>
+                          </a:solidFill>
+                          <a:effectLst/>
+                          <a:latin typeface="Calibri"/>
+                        </a:rPr>
+                        <a:t>-commons</a:t>
+                      </a:r>
+                      <a:endParaRPr lang="en-US" sz="1000" b="0" i="0" u="none" strike="noStrike" dirty="0">
+                        <a:solidFill>
+                          <a:srgbClr val="000000"/>
+                        </a:solidFill>
+                        <a:effectLst/>
+                        <a:latin typeface="Calibri"/>
+                      </a:endParaRPr>
+                    </a:p>
+                  </a:txBody>
+                  <a:tcPr marL="9525" marR="9525" marT="9525" marB="0" anchor="ctr"/>
+                </a:tc>
+                <a:tc>
+                  <a:txBody>
+                    <a:bodyPr/>
+                    <a:lstStyle/>
+                    <a:p>
+                      <a:pPr algn="ctr" fontAlgn="ctr"/>
+                      <a:r>
+                        <a:rPr lang="en-US" sz="1000" b="0" i="0" u="none" strike="noStrike">
+                          <a:solidFill>
+                            <a:srgbClr val="000000"/>
+                          </a:solidFill>
+                          <a:effectLst/>
+                          <a:latin typeface="Calibri"/>
+                        </a:rPr>
+                        <a:t>–</a:t>
+                      </a:r>
+                    </a:p>
+                  </a:txBody>
+                  <a:tcPr marL="9525" marR="9525" marT="9525" marB="0" anchor="ctr"/>
+                </a:tc>
+              </a:tr>
+              <a:tr h="211642">
+                <a:tc>
+                  <a:txBody>
+                    <a:bodyPr/>
+                    <a:lstStyle/>
+                    <a:p>
+                      <a:pPr algn="ctr" fontAlgn="ctr"/>
+                      <a:r>
+                        <a:rPr lang="en-US" sz="1000" b="1" i="0" u="none" strike="noStrike" dirty="0">
+                          <a:solidFill>
+                            <a:srgbClr val="000000"/>
+                          </a:solidFill>
+                          <a:effectLst/>
+                          <a:latin typeface="Calibri"/>
+                        </a:rPr>
+                        <a:t>Required Java version</a:t>
+                      </a:r>
+                    </a:p>
+                  </a:txBody>
+                  <a:tcPr marL="9525" marR="9525" marT="9525" marB="0" anchor="ctr">
+                    <a:solidFill>
+                      <a:schemeClr val="accent1"/>
+                    </a:solidFill>
+                  </a:tcPr>
+                </a:tc>
+                <a:tc>
+                  <a:txBody>
+                    <a:bodyPr/>
+                    <a:lstStyle/>
+                    <a:p>
+                      <a:pPr algn="ctr" fontAlgn="ctr"/>
+                      <a:r>
+                        <a:rPr lang="en-US" sz="1000" b="0" i="0" u="none" strike="noStrike" dirty="0">
+                          <a:solidFill>
+                            <a:srgbClr val="000000"/>
+                          </a:solidFill>
+                          <a:effectLst/>
+                          <a:latin typeface="Calibri"/>
+                        </a:rPr>
+                        <a:t>1.6.0</a:t>
+                      </a:r>
+                    </a:p>
+                  </a:txBody>
+                  <a:tcPr marL="9525" marR="9525" marT="9525" marB="0" anchor="ctr"/>
+                </a:tc>
+                <a:tc>
+                  <a:txBody>
+                    <a:bodyPr/>
+                    <a:lstStyle/>
+                    <a:p>
+                      <a:pPr algn="ctr" fontAlgn="ctr"/>
+                      <a:r>
+                        <a:rPr lang="en-US" sz="1000" b="0" i="0" u="none" strike="noStrike" dirty="0">
+                          <a:solidFill>
+                            <a:srgbClr val="000000"/>
+                          </a:solidFill>
+                          <a:effectLst/>
+                          <a:latin typeface="Calibri"/>
+                        </a:rPr>
+                        <a:t>1.5.0</a:t>
+                      </a:r>
+                    </a:p>
+                  </a:txBody>
+                  <a:tcPr marL="9525" marR="9525" marT="9525" marB="0" anchor="ctr"/>
+                </a:tc>
+                <a:tc>
+                  <a:txBody>
+                    <a:bodyPr/>
+                    <a:lstStyle/>
+                    <a:p>
+                      <a:pPr algn="ctr" fontAlgn="ctr"/>
+                      <a:r>
+                        <a:rPr lang="en-US" sz="1000" b="0" i="0" u="none" strike="noStrike" dirty="0">
+                          <a:solidFill>
+                            <a:srgbClr val="000000"/>
+                          </a:solidFill>
+                          <a:effectLst/>
+                          <a:latin typeface="Calibri"/>
+                        </a:rPr>
+                        <a:t>1.6.0</a:t>
+                      </a:r>
+                    </a:p>
+                  </a:txBody>
+                  <a:tcPr marL="9525" marR="9525" marT="9525" marB="0" anchor="ctr"/>
+                </a:tc>
+              </a:tr>
+              <a:tr h="211642">
+                <a:tc>
+                  <a:txBody>
+                    <a:bodyPr/>
+                    <a:lstStyle/>
+                    <a:p>
+                      <a:pPr algn="ctr" fontAlgn="ctr"/>
+                      <a:r>
+                        <a:rPr lang="en-US" sz="1000" b="1" i="0" u="none" strike="noStrike" dirty="0">
+                          <a:solidFill>
+                            <a:srgbClr val="000000"/>
+                          </a:solidFill>
+                          <a:effectLst/>
+                          <a:latin typeface="Calibri"/>
+                        </a:rPr>
+                        <a:t>Native export formats</a:t>
+                      </a:r>
+                    </a:p>
+                  </a:txBody>
+                  <a:tcPr marL="9525" marR="9525" marT="9525" marB="0" anchor="ctr">
+                    <a:solidFill>
+                      <a:schemeClr val="accent1"/>
+                    </a:solidFill>
+                  </a:tcPr>
+                </a:tc>
+                <a:tc>
+                  <a:txBody>
+                    <a:bodyPr/>
+                    <a:lstStyle/>
+                    <a:p>
+                      <a:pPr algn="ctr" fontAlgn="ctr"/>
+                      <a:r>
+                        <a:rPr lang="en-US" sz="1000" b="0" i="0" u="none" strike="noStrike" dirty="0">
+                          <a:solidFill>
+                            <a:srgbClr val="000000"/>
+                          </a:solidFill>
+                          <a:effectLst/>
+                          <a:latin typeface="Calibri"/>
+                        </a:rPr>
+                        <a:t>BMP, GIF, JPEG, PNG, WBMP</a:t>
+                      </a:r>
+                    </a:p>
+                  </a:txBody>
+                  <a:tcPr marL="9525" marR="9525" marT="9525" marB="0" anchor="ctr"/>
+                </a:tc>
+                <a:tc>
+                  <a:txBody>
+                    <a:bodyPr/>
+                    <a:lstStyle/>
+                    <a:p>
+                      <a:pPr algn="ctr" fontAlgn="ctr"/>
+                      <a:r>
+                        <a:rPr lang="en-US" sz="1000" b="0" i="0" u="none" strike="noStrike" dirty="0">
+                          <a:solidFill>
+                            <a:srgbClr val="000000"/>
+                          </a:solidFill>
+                          <a:effectLst/>
+                          <a:latin typeface="Calibri"/>
+                        </a:rPr>
+                        <a:t>BMP, GIF, JPEG, PNG, WBMP</a:t>
+                      </a:r>
+                    </a:p>
+                  </a:txBody>
+                  <a:tcPr marL="9525" marR="9525" marT="9525" marB="0" anchor="ctr"/>
+                </a:tc>
+                <a:tc>
+                  <a:txBody>
+                    <a:bodyPr/>
+                    <a:lstStyle/>
+                    <a:p>
+                      <a:pPr algn="ctr" fontAlgn="ctr"/>
+                      <a:r>
+                        <a:rPr lang="en-US" sz="1000" b="0" i="0" u="none" strike="noStrike" dirty="0">
+                          <a:solidFill>
+                            <a:srgbClr val="000000"/>
+                          </a:solidFill>
+                          <a:effectLst/>
+                          <a:latin typeface="Calibri"/>
+                        </a:rPr>
+                        <a:t>JPEG, PNG</a:t>
+                      </a:r>
+                    </a:p>
+                  </a:txBody>
+                  <a:tcPr marL="9525" marR="9525" marT="9525" marB="0" anchor="ctr"/>
+                </a:tc>
+              </a:tr>
+              <a:tr h="211642">
+                <a:tc>
+                  <a:txBody>
+                    <a:bodyPr/>
+                    <a:lstStyle/>
+                    <a:p>
+                      <a:pPr algn="ctr" fontAlgn="ctr"/>
+                      <a:r>
+                        <a:rPr lang="en-US" sz="1000" b="1" i="0" u="none" strike="noStrike" dirty="0">
+                          <a:solidFill>
+                            <a:srgbClr val="000000"/>
+                          </a:solidFill>
+                          <a:effectLst/>
+                          <a:latin typeface="Calibri"/>
+                        </a:rPr>
+                        <a:t>Scatter plot (2D / 3D)</a:t>
+                      </a:r>
+                    </a:p>
+                  </a:txBody>
+                  <a:tcPr marL="9525" marR="9525" marT="9525" marB="0" anchor="ctr">
+                    <a:solidFill>
+                      <a:schemeClr val="accent1"/>
+                    </a:solidFill>
+                  </a:tcPr>
+                </a:tc>
+                <a:tc>
+                  <a:txBody>
+                    <a:bodyPr/>
+                    <a:lstStyle/>
+                    <a:p>
+                      <a:pPr algn="ctr" fontAlgn="ctr"/>
+                      <a:r>
+                        <a:rPr lang="en-US" sz="1000" b="0" i="0" u="none" strike="noStrike" dirty="0" smtClean="0">
+                          <a:solidFill>
+                            <a:srgbClr val="000000"/>
+                          </a:solidFill>
+                          <a:effectLst/>
+                          <a:latin typeface="Calibri"/>
+                        </a:rPr>
+                        <a:t>+ </a:t>
+                      </a:r>
+                      <a:r>
+                        <a:rPr lang="en-US" sz="1000" b="0" i="0" u="none" strike="noStrike" dirty="0">
+                          <a:solidFill>
+                            <a:srgbClr val="000000"/>
+                          </a:solidFill>
+                          <a:effectLst/>
+                          <a:latin typeface="Calibri"/>
+                        </a:rPr>
+                        <a:t>/ –</a:t>
+                      </a:r>
+                    </a:p>
+                  </a:txBody>
+                  <a:tcPr marL="9525" marR="9525" marT="9525" marB="0" anchor="ctr"/>
+                </a:tc>
+                <a:tc>
+                  <a:txBody>
+                    <a:bodyPr/>
+                    <a:lstStyle/>
+                    <a:p>
+                      <a:pPr algn="ctr" fontAlgn="ctr"/>
+                      <a:r>
+                        <a:rPr lang="en-US" sz="1000" b="0" i="0" u="none" strike="noStrike" dirty="0" smtClean="0">
+                          <a:solidFill>
+                            <a:srgbClr val="000000"/>
+                          </a:solidFill>
+                          <a:effectLst/>
+                          <a:latin typeface="Calibri"/>
+                        </a:rPr>
+                        <a:t>+ </a:t>
+                      </a:r>
+                      <a:r>
+                        <a:rPr lang="en-US" sz="1000" b="0" i="0" u="none" strike="noStrike" dirty="0">
+                          <a:solidFill>
+                            <a:srgbClr val="000000"/>
+                          </a:solidFill>
+                          <a:effectLst/>
+                          <a:latin typeface="Calibri"/>
+                        </a:rPr>
+                        <a:t>/ –</a:t>
+                      </a:r>
+                    </a:p>
+                  </a:txBody>
+                  <a:tcPr marL="9525" marR="9525" marT="9525" marB="0" anchor="ctr"/>
+                </a:tc>
+                <a:tc>
+                  <a:txBody>
+                    <a:bodyPr/>
+                    <a:lstStyle/>
+                    <a:p>
+                      <a:pPr algn="ctr" fontAlgn="ctr"/>
+                      <a:r>
+                        <a:rPr lang="en-US" sz="1000" b="0" i="0" u="none" strike="noStrike" dirty="0" smtClean="0">
+                          <a:solidFill>
+                            <a:srgbClr val="000000"/>
+                          </a:solidFill>
+                          <a:effectLst/>
+                          <a:latin typeface="Calibri"/>
+                        </a:rPr>
+                        <a:t>+ </a:t>
+                      </a:r>
+                      <a:r>
+                        <a:rPr lang="en-US" sz="1000" b="0" i="0" u="none" strike="noStrike" dirty="0">
+                          <a:solidFill>
+                            <a:srgbClr val="000000"/>
+                          </a:solidFill>
+                          <a:effectLst/>
+                          <a:latin typeface="Calibri"/>
+                        </a:rPr>
+                        <a:t>/ –</a:t>
+                      </a:r>
+                    </a:p>
+                  </a:txBody>
+                  <a:tcPr marL="9525" marR="9525" marT="9525" marB="0" anchor="ctr"/>
+                </a:tc>
+              </a:tr>
+              <a:tr h="211642">
+                <a:tc>
+                  <a:txBody>
+                    <a:bodyPr/>
+                    <a:lstStyle/>
+                    <a:p>
+                      <a:pPr algn="ctr" fontAlgn="ctr"/>
+                      <a:r>
+                        <a:rPr lang="en-US" sz="1000" b="1" i="0" u="none" strike="noStrike" dirty="0">
+                          <a:solidFill>
+                            <a:srgbClr val="000000"/>
+                          </a:solidFill>
+                          <a:effectLst/>
+                          <a:latin typeface="Calibri"/>
+                        </a:rPr>
+                        <a:t>Line plot (2D / 3D)</a:t>
+                      </a:r>
+                    </a:p>
+                  </a:txBody>
+                  <a:tcPr marL="9525" marR="9525" marT="9525" marB="0" anchor="ctr">
+                    <a:solidFill>
+                      <a:schemeClr val="accent1"/>
+                    </a:solidFill>
+                  </a:tcPr>
+                </a:tc>
+                <a:tc>
+                  <a:txBody>
+                    <a:bodyPr/>
+                    <a:lstStyle/>
+                    <a:p>
+                      <a:pPr algn="ctr" fontAlgn="ctr"/>
+                      <a:r>
+                        <a:rPr lang="en-US" sz="1000" b="0" i="0" u="none" strike="noStrike" dirty="0" smtClean="0">
+                          <a:solidFill>
+                            <a:srgbClr val="000000"/>
+                          </a:solidFill>
+                          <a:effectLst/>
+                          <a:latin typeface="Calibri"/>
+                        </a:rPr>
+                        <a:t>+ </a:t>
+                      </a:r>
+                      <a:r>
+                        <a:rPr lang="en-US" sz="1000" b="0" i="0" u="none" strike="noStrike" dirty="0">
+                          <a:solidFill>
+                            <a:srgbClr val="000000"/>
+                          </a:solidFill>
+                          <a:effectLst/>
+                          <a:latin typeface="Calibri"/>
+                        </a:rPr>
+                        <a:t>/ –</a:t>
+                      </a:r>
+                    </a:p>
+                  </a:txBody>
+                  <a:tcPr marL="9525" marR="9525" marT="9525" marB="0" anchor="ctr"/>
+                </a:tc>
+                <a:tc>
+                  <a:txBody>
+                    <a:bodyPr/>
+                    <a:lstStyle/>
+                    <a:p>
+                      <a:pPr algn="ctr" fontAlgn="ctr"/>
+                      <a:r>
+                        <a:rPr lang="en-US" sz="1000" b="0" i="0" u="none" strike="noStrike" dirty="0" smtClean="0">
+                          <a:solidFill>
+                            <a:srgbClr val="000000"/>
+                          </a:solidFill>
+                          <a:effectLst/>
+                          <a:latin typeface="Calibri"/>
+                        </a:rPr>
+                        <a:t>+ </a:t>
+                      </a:r>
+                      <a:r>
+                        <a:rPr lang="en-US" sz="1000" b="0" i="0" u="none" strike="noStrike" dirty="0">
+                          <a:solidFill>
+                            <a:srgbClr val="000000"/>
+                          </a:solidFill>
+                          <a:effectLst/>
+                          <a:latin typeface="Calibri"/>
+                        </a:rPr>
+                        <a:t>/ –</a:t>
+                      </a:r>
+                    </a:p>
+                  </a:txBody>
+                  <a:tcPr marL="9525" marR="9525" marT="9525" marB="0" anchor="ctr"/>
+                </a:tc>
+                <a:tc>
+                  <a:txBody>
+                    <a:bodyPr/>
+                    <a:lstStyle/>
+                    <a:p>
+                      <a:pPr algn="ctr" fontAlgn="ctr"/>
+                      <a:r>
+                        <a:rPr lang="en-US" sz="1000" b="0" i="0" u="none" strike="noStrike" dirty="0" smtClean="0">
+                          <a:solidFill>
+                            <a:srgbClr val="000000"/>
+                          </a:solidFill>
+                          <a:effectLst/>
+                          <a:latin typeface="Calibri"/>
+                        </a:rPr>
+                        <a:t>+ </a:t>
+                      </a:r>
+                      <a:r>
+                        <a:rPr lang="en-US" sz="1000" b="0" i="0" u="none" strike="noStrike" dirty="0">
+                          <a:solidFill>
+                            <a:srgbClr val="000000"/>
+                          </a:solidFill>
+                          <a:effectLst/>
+                          <a:latin typeface="Calibri"/>
+                        </a:rPr>
+                        <a:t>/ –</a:t>
+                      </a:r>
+                    </a:p>
+                  </a:txBody>
+                  <a:tcPr marL="9525" marR="9525" marT="9525" marB="0" anchor="ctr"/>
+                </a:tc>
+              </a:tr>
+              <a:tr h="211642">
+                <a:tc>
+                  <a:txBody>
+                    <a:bodyPr/>
+                    <a:lstStyle/>
+                    <a:p>
+                      <a:pPr algn="ctr" fontAlgn="ctr"/>
+                      <a:r>
+                        <a:rPr lang="en-US" sz="1000" b="1" i="0" u="none" strike="noStrike" dirty="0">
+                          <a:solidFill>
+                            <a:srgbClr val="000000"/>
+                          </a:solidFill>
+                          <a:effectLst/>
+                          <a:latin typeface="Calibri"/>
+                        </a:rPr>
+                        <a:t>Area plot (2D / 3D)</a:t>
+                      </a:r>
+                    </a:p>
+                  </a:txBody>
+                  <a:tcPr marL="9525" marR="9525" marT="9525" marB="0" anchor="ctr">
+                    <a:solidFill>
+                      <a:schemeClr val="accent1"/>
+                    </a:solidFill>
+                  </a:tcPr>
+                </a:tc>
+                <a:tc>
+                  <a:txBody>
+                    <a:bodyPr/>
+                    <a:lstStyle/>
+                    <a:p>
+                      <a:pPr algn="ctr" fontAlgn="ctr"/>
+                      <a:r>
+                        <a:rPr lang="en-US" sz="1000" b="0" i="0" u="none" strike="noStrike" dirty="0" smtClean="0">
+                          <a:solidFill>
+                            <a:srgbClr val="000000"/>
+                          </a:solidFill>
+                          <a:effectLst/>
+                          <a:latin typeface="Calibri"/>
+                        </a:rPr>
+                        <a:t>+ </a:t>
+                      </a:r>
+                      <a:r>
+                        <a:rPr lang="en-US" sz="1000" b="0" i="0" u="none" strike="noStrike" dirty="0">
+                          <a:solidFill>
+                            <a:srgbClr val="000000"/>
+                          </a:solidFill>
+                          <a:effectLst/>
+                          <a:latin typeface="Calibri"/>
+                        </a:rPr>
+                        <a:t>/ –</a:t>
+                      </a:r>
+                    </a:p>
+                  </a:txBody>
+                  <a:tcPr marL="9525" marR="9525" marT="9525" marB="0" anchor="ctr"/>
+                </a:tc>
+                <a:tc>
+                  <a:txBody>
+                    <a:bodyPr/>
+                    <a:lstStyle/>
+                    <a:p>
+                      <a:pPr algn="ctr" fontAlgn="ctr"/>
+                      <a:r>
+                        <a:rPr lang="en-US" sz="1000" b="0" i="0" u="none" strike="noStrike" dirty="0" smtClean="0">
+                          <a:solidFill>
+                            <a:srgbClr val="000000"/>
+                          </a:solidFill>
+                          <a:effectLst/>
+                          <a:latin typeface="Calibri"/>
+                        </a:rPr>
+                        <a:t>+ </a:t>
+                      </a:r>
+                      <a:r>
+                        <a:rPr lang="en-US" sz="1000" b="0" i="0" u="none" strike="noStrike" dirty="0">
+                          <a:solidFill>
+                            <a:srgbClr val="000000"/>
+                          </a:solidFill>
+                          <a:effectLst/>
+                          <a:latin typeface="Calibri"/>
+                        </a:rPr>
+                        <a:t>/ –</a:t>
+                      </a:r>
+                    </a:p>
+                  </a:txBody>
+                  <a:tcPr marL="9525" marR="9525" marT="9525" marB="0" anchor="ctr"/>
+                </a:tc>
+                <a:tc>
+                  <a:txBody>
+                    <a:bodyPr/>
+                    <a:lstStyle/>
+                    <a:p>
+                      <a:pPr algn="ctr" fontAlgn="ctr"/>
+                      <a:r>
+                        <a:rPr lang="en-US" sz="1000" b="0" i="0" u="none" strike="noStrike" dirty="0" smtClean="0">
+                          <a:solidFill>
+                            <a:srgbClr val="000000"/>
+                          </a:solidFill>
+                          <a:effectLst/>
+                          <a:latin typeface="Calibri"/>
+                        </a:rPr>
+                        <a:t>+ </a:t>
+                      </a:r>
+                      <a:r>
+                        <a:rPr lang="en-US" sz="1000" b="0" i="0" u="none" strike="noStrike" dirty="0">
+                          <a:solidFill>
+                            <a:srgbClr val="000000"/>
+                          </a:solidFill>
+                          <a:effectLst/>
+                          <a:latin typeface="Calibri"/>
+                        </a:rPr>
+                        <a:t>/ –</a:t>
+                      </a:r>
+                    </a:p>
+                  </a:txBody>
+                  <a:tcPr marL="9525" marR="9525" marT="9525" marB="0" anchor="ctr"/>
+                </a:tc>
+              </a:tr>
+              <a:tr h="211642">
+                <a:tc>
+                  <a:txBody>
+                    <a:bodyPr/>
+                    <a:lstStyle/>
+                    <a:p>
+                      <a:pPr algn="ctr" fontAlgn="ctr"/>
+                      <a:r>
+                        <a:rPr lang="en-US" sz="1000" b="1" i="0" u="none" strike="noStrike" dirty="0">
+                          <a:solidFill>
+                            <a:srgbClr val="000000"/>
+                          </a:solidFill>
+                          <a:effectLst/>
+                          <a:latin typeface="Calibri"/>
+                        </a:rPr>
+                        <a:t>Pie plot (2D / 3D)</a:t>
+                      </a:r>
+                    </a:p>
+                  </a:txBody>
+                  <a:tcPr marL="9525" marR="9525" marT="9525" marB="0" anchor="ctr">
+                    <a:solidFill>
+                      <a:schemeClr val="accent1"/>
+                    </a:solidFill>
+                  </a:tcPr>
+                </a:tc>
+                <a:tc>
+                  <a:txBody>
+                    <a:bodyPr/>
+                    <a:lstStyle/>
+                    <a:p>
+                      <a:pPr algn="ctr" fontAlgn="ctr"/>
+                      <a:r>
+                        <a:rPr lang="en-US" sz="1000" b="0" i="0" u="none" strike="noStrike" dirty="0" smtClean="0">
+                          <a:solidFill>
+                            <a:srgbClr val="000000"/>
+                          </a:solidFill>
+                          <a:effectLst/>
+                          <a:latin typeface="Calibri"/>
+                        </a:rPr>
+                        <a:t>+ /</a:t>
+                      </a:r>
+                      <a:r>
+                        <a:rPr lang="en-US" sz="1000" b="0" i="0" u="none" strike="noStrike" baseline="0" dirty="0" smtClean="0">
+                          <a:solidFill>
+                            <a:srgbClr val="000000"/>
+                          </a:solidFill>
+                          <a:effectLst/>
+                          <a:latin typeface="Calibri"/>
+                        </a:rPr>
+                        <a:t> +</a:t>
+                      </a:r>
+                      <a:endParaRPr lang="en-US" sz="1000" b="0" i="0" u="none" strike="noStrike" dirty="0">
+                        <a:solidFill>
+                          <a:srgbClr val="000000"/>
+                        </a:solidFill>
+                        <a:effectLst/>
+                        <a:latin typeface="Calibri"/>
+                      </a:endParaRPr>
+                    </a:p>
+                  </a:txBody>
+                  <a:tcPr marL="9525" marR="9525" marT="9525" marB="0" anchor="ctr"/>
+                </a:tc>
+                <a:tc>
+                  <a:txBody>
+                    <a:bodyPr/>
+                    <a:lstStyle/>
+                    <a:p>
+                      <a:pPr algn="ctr" fontAlgn="ctr"/>
+                      <a:r>
+                        <a:rPr lang="en-US" sz="1000" b="0" i="0" u="none" strike="noStrike" dirty="0" smtClean="0">
+                          <a:solidFill>
+                            <a:srgbClr val="000000"/>
+                          </a:solidFill>
+                          <a:effectLst/>
+                          <a:latin typeface="Calibri"/>
+                        </a:rPr>
+                        <a:t>+ </a:t>
+                      </a:r>
+                      <a:r>
+                        <a:rPr lang="en-US" sz="1000" b="0" i="0" u="none" strike="noStrike" dirty="0">
+                          <a:solidFill>
+                            <a:srgbClr val="000000"/>
+                          </a:solidFill>
+                          <a:effectLst/>
+                          <a:latin typeface="Calibri"/>
+                        </a:rPr>
+                        <a:t>/ –</a:t>
+                      </a:r>
+                    </a:p>
+                  </a:txBody>
+                  <a:tcPr marL="9525" marR="9525" marT="9525" marB="0" anchor="ctr"/>
+                </a:tc>
+                <a:tc>
+                  <a:txBody>
+                    <a:bodyPr/>
+                    <a:lstStyle/>
+                    <a:p>
+                      <a:pPr algn="ctr" fontAlgn="ctr"/>
+                      <a:r>
+                        <a:rPr lang="en-US" sz="1000" b="0" i="0" u="none" strike="noStrike" dirty="0">
+                          <a:solidFill>
+                            <a:srgbClr val="000000"/>
+                          </a:solidFill>
+                          <a:effectLst/>
+                          <a:latin typeface="Calibri"/>
+                        </a:rPr>
+                        <a:t>– / –</a:t>
+                      </a:r>
+                    </a:p>
+                  </a:txBody>
+                  <a:tcPr marL="9525" marR="9525" marT="9525" marB="0" anchor="ctr"/>
+                </a:tc>
+              </a:tr>
+              <a:tr h="211642">
+                <a:tc>
+                  <a:txBody>
+                    <a:bodyPr/>
+                    <a:lstStyle/>
+                    <a:p>
+                      <a:pPr algn="ctr" fontAlgn="ctr"/>
+                      <a:r>
+                        <a:rPr lang="en-US" sz="1000" b="1" i="0" u="none" strike="noStrike" dirty="0">
+                          <a:solidFill>
+                            <a:srgbClr val="000000"/>
+                          </a:solidFill>
+                          <a:effectLst/>
+                          <a:latin typeface="Calibri"/>
+                        </a:rPr>
+                        <a:t>Donut plot (2D / 3D)</a:t>
+                      </a:r>
+                    </a:p>
+                  </a:txBody>
+                  <a:tcPr marL="9525" marR="9525" marT="9525" marB="0" anchor="ctr">
+                    <a:solidFill>
+                      <a:schemeClr val="accent1"/>
+                    </a:solidFill>
+                  </a:tcPr>
+                </a:tc>
+                <a:tc>
+                  <a:txBody>
+                    <a:bodyPr/>
+                    <a:lstStyle/>
+                    <a:p>
+                      <a:pPr algn="ctr" fontAlgn="ctr"/>
+                      <a:r>
+                        <a:rPr lang="en-US" sz="1000" b="0" i="0" u="none" strike="noStrike" dirty="0" smtClean="0">
+                          <a:solidFill>
+                            <a:srgbClr val="000000"/>
+                          </a:solidFill>
+                          <a:effectLst/>
+                          <a:latin typeface="Calibri"/>
+                        </a:rPr>
+                        <a:t>+ </a:t>
+                      </a:r>
+                      <a:r>
+                        <a:rPr lang="en-US" sz="1000" b="0" i="0" u="none" strike="noStrike" dirty="0">
+                          <a:solidFill>
+                            <a:srgbClr val="000000"/>
+                          </a:solidFill>
+                          <a:effectLst/>
+                          <a:latin typeface="Calibri"/>
+                        </a:rPr>
+                        <a:t>/ –</a:t>
+                      </a:r>
+                    </a:p>
+                  </a:txBody>
+                  <a:tcPr marL="9525" marR="9525" marT="9525" marB="0" anchor="ctr"/>
+                </a:tc>
+                <a:tc>
+                  <a:txBody>
+                    <a:bodyPr/>
+                    <a:lstStyle/>
+                    <a:p>
+                      <a:pPr algn="ctr" fontAlgn="ctr"/>
+                      <a:r>
+                        <a:rPr lang="en-US" sz="1000" b="0" i="0" u="none" strike="noStrike" dirty="0" smtClean="0">
+                          <a:solidFill>
+                            <a:srgbClr val="000000"/>
+                          </a:solidFill>
+                          <a:effectLst/>
+                          <a:latin typeface="Calibri"/>
+                        </a:rPr>
+                        <a:t>+ </a:t>
+                      </a:r>
+                      <a:r>
+                        <a:rPr lang="en-US" sz="1000" b="0" i="0" u="none" strike="noStrike" dirty="0">
+                          <a:solidFill>
+                            <a:srgbClr val="000000"/>
+                          </a:solidFill>
+                          <a:effectLst/>
+                          <a:latin typeface="Calibri"/>
+                        </a:rPr>
+                        <a:t>/ –</a:t>
+                      </a:r>
+                    </a:p>
+                  </a:txBody>
+                  <a:tcPr marL="9525" marR="9525" marT="9525" marB="0" anchor="ctr"/>
+                </a:tc>
+                <a:tc>
+                  <a:txBody>
+                    <a:bodyPr/>
+                    <a:lstStyle/>
+                    <a:p>
+                      <a:pPr algn="ctr" fontAlgn="ctr"/>
+                      <a:r>
+                        <a:rPr lang="en-US" sz="1000" b="0" i="0" u="none" strike="noStrike" dirty="0">
+                          <a:solidFill>
+                            <a:srgbClr val="000000"/>
+                          </a:solidFill>
+                          <a:effectLst/>
+                          <a:latin typeface="Calibri"/>
+                        </a:rPr>
+                        <a:t>– / –</a:t>
+                      </a:r>
+                    </a:p>
+                  </a:txBody>
+                  <a:tcPr marL="9525" marR="9525" marT="9525" marB="0" anchor="ctr"/>
+                </a:tc>
+              </a:tr>
+              <a:tr h="211642">
+                <a:tc>
+                  <a:txBody>
+                    <a:bodyPr/>
+                    <a:lstStyle/>
+                    <a:p>
+                      <a:pPr algn="ctr" fontAlgn="ctr"/>
+                      <a:r>
+                        <a:rPr lang="en-US" sz="1000" b="1" i="0" u="none" strike="noStrike" dirty="0">
+                          <a:solidFill>
+                            <a:srgbClr val="000000"/>
+                          </a:solidFill>
+                          <a:effectLst/>
+                          <a:latin typeface="Calibri"/>
+                        </a:rPr>
+                        <a:t>Horizontal bars (2D / 3D)</a:t>
+                      </a:r>
+                    </a:p>
+                  </a:txBody>
+                  <a:tcPr marL="9525" marR="9525" marT="9525" marB="0" anchor="ctr">
+                    <a:solidFill>
+                      <a:schemeClr val="accent1"/>
+                    </a:solidFill>
+                  </a:tcPr>
+                </a:tc>
+                <a:tc>
+                  <a:txBody>
+                    <a:bodyPr/>
+                    <a:lstStyle/>
+                    <a:p>
+                      <a:pPr algn="ctr" fontAlgn="ctr"/>
+                      <a:r>
+                        <a:rPr lang="en-US" sz="1000" b="0" i="0" u="none" strike="noStrike" dirty="0" smtClean="0">
+                          <a:solidFill>
+                            <a:srgbClr val="000000"/>
+                          </a:solidFill>
+                          <a:effectLst/>
+                          <a:latin typeface="Calibri"/>
+                        </a:rPr>
+                        <a:t>+ / +</a:t>
+                      </a:r>
+                      <a:endParaRPr lang="en-US" sz="1000" b="0" i="0" u="none" strike="noStrike" dirty="0">
+                        <a:solidFill>
+                          <a:srgbClr val="000000"/>
+                        </a:solidFill>
+                        <a:effectLst/>
+                        <a:latin typeface="Calibri"/>
+                      </a:endParaRPr>
+                    </a:p>
+                  </a:txBody>
+                  <a:tcPr marL="9525" marR="9525" marT="9525" marB="0" anchor="ctr"/>
+                </a:tc>
+                <a:tc>
+                  <a:txBody>
+                    <a:bodyPr/>
+                    <a:lstStyle/>
+                    <a:p>
+                      <a:pPr algn="ctr" fontAlgn="ctr"/>
+                      <a:r>
+                        <a:rPr lang="en-US" sz="1000" b="0" i="0" u="none" strike="noStrike" dirty="0">
+                          <a:solidFill>
+                            <a:srgbClr val="000000"/>
+                          </a:solidFill>
+                          <a:effectLst/>
+                          <a:latin typeface="Calibri"/>
+                        </a:rPr>
+                        <a:t>– / –</a:t>
+                      </a:r>
+                    </a:p>
+                  </a:txBody>
+                  <a:tcPr marL="9525" marR="9525" marT="9525" marB="0" anchor="ctr"/>
+                </a:tc>
+                <a:tc>
+                  <a:txBody>
+                    <a:bodyPr/>
+                    <a:lstStyle/>
+                    <a:p>
+                      <a:pPr algn="ctr" fontAlgn="ctr"/>
+                      <a:r>
+                        <a:rPr lang="en-US" sz="1000" b="0" i="0" u="none" strike="noStrike" dirty="0">
+                          <a:solidFill>
+                            <a:srgbClr val="000000"/>
+                          </a:solidFill>
+                          <a:effectLst/>
+                          <a:latin typeface="Calibri"/>
+                        </a:rPr>
+                        <a:t>– / –</a:t>
+                      </a:r>
+                    </a:p>
+                  </a:txBody>
+                  <a:tcPr marL="9525" marR="9525" marT="9525" marB="0" anchor="ctr"/>
+                </a:tc>
+              </a:tr>
+              <a:tr h="211642">
+                <a:tc>
+                  <a:txBody>
+                    <a:bodyPr/>
+                    <a:lstStyle/>
+                    <a:p>
+                      <a:pPr algn="ctr" fontAlgn="ctr"/>
+                      <a:r>
+                        <a:rPr lang="en-US" sz="1000" b="1" i="0" u="none" strike="noStrike" dirty="0">
+                          <a:solidFill>
+                            <a:srgbClr val="000000"/>
+                          </a:solidFill>
+                          <a:effectLst/>
+                          <a:latin typeface="Calibri"/>
+                        </a:rPr>
+                        <a:t>Vertical bars (2D / 3D)</a:t>
+                      </a:r>
+                    </a:p>
+                  </a:txBody>
+                  <a:tcPr marL="9525" marR="9525" marT="9525" marB="0" anchor="ctr">
+                    <a:solidFill>
+                      <a:schemeClr val="accent1"/>
+                    </a:solidFill>
+                  </a:tcPr>
+                </a:tc>
+                <a:tc>
+                  <a:txBody>
+                    <a:bodyPr/>
+                    <a:lstStyle/>
+                    <a:p>
+                      <a:pPr algn="ctr" fontAlgn="ctr"/>
+                      <a:r>
+                        <a:rPr lang="en-US" sz="1000" b="0" i="0" u="none" strike="noStrike" dirty="0" smtClean="0">
+                          <a:solidFill>
+                            <a:srgbClr val="000000"/>
+                          </a:solidFill>
+                          <a:effectLst/>
+                          <a:latin typeface="Calibri"/>
+                        </a:rPr>
+                        <a:t>+ </a:t>
+                      </a:r>
+                      <a:r>
+                        <a:rPr lang="en-US" sz="1000" b="0" i="0" u="none" strike="noStrike" dirty="0">
+                          <a:solidFill>
+                            <a:srgbClr val="000000"/>
+                          </a:solidFill>
+                          <a:effectLst/>
+                          <a:latin typeface="Calibri"/>
+                        </a:rPr>
+                        <a:t>/ </a:t>
+                      </a:r>
+                      <a:r>
+                        <a:rPr lang="en-US" sz="1000" b="0" i="0" u="none" strike="noStrike" dirty="0" smtClean="0">
+                          <a:solidFill>
+                            <a:srgbClr val="000000"/>
+                          </a:solidFill>
+                          <a:effectLst/>
+                          <a:latin typeface="Calibri"/>
+                        </a:rPr>
+                        <a:t>+</a:t>
+                      </a:r>
+                      <a:endParaRPr lang="en-US" sz="1000" b="0" i="0" u="none" strike="noStrike" dirty="0">
+                        <a:solidFill>
+                          <a:srgbClr val="000000"/>
+                        </a:solidFill>
+                        <a:effectLst/>
+                        <a:latin typeface="Calibri"/>
+                      </a:endParaRPr>
+                    </a:p>
+                  </a:txBody>
+                  <a:tcPr marL="9525" marR="9525" marT="9525" marB="0" anchor="ctr"/>
+                </a:tc>
+                <a:tc>
+                  <a:txBody>
+                    <a:bodyPr/>
+                    <a:lstStyle/>
+                    <a:p>
+                      <a:pPr algn="ctr" fontAlgn="ctr"/>
+                      <a:r>
+                        <a:rPr lang="en-US" sz="1000" b="0" i="0" u="none" strike="noStrike" dirty="0" smtClean="0">
+                          <a:solidFill>
+                            <a:srgbClr val="000000"/>
+                          </a:solidFill>
+                          <a:effectLst/>
+                          <a:latin typeface="Calibri"/>
+                        </a:rPr>
+                        <a:t>+ </a:t>
+                      </a:r>
+                      <a:r>
+                        <a:rPr lang="en-US" sz="1000" b="0" i="0" u="none" strike="noStrike" dirty="0">
+                          <a:solidFill>
+                            <a:srgbClr val="000000"/>
+                          </a:solidFill>
+                          <a:effectLst/>
+                          <a:latin typeface="Calibri"/>
+                        </a:rPr>
+                        <a:t>/ –</a:t>
+                      </a:r>
+                    </a:p>
+                  </a:txBody>
+                  <a:tcPr marL="9525" marR="9525" marT="9525" marB="0" anchor="ctr"/>
+                </a:tc>
+                <a:tc>
+                  <a:txBody>
+                    <a:bodyPr/>
+                    <a:lstStyle/>
+                    <a:p>
+                      <a:pPr algn="ctr" fontAlgn="ctr"/>
+                      <a:r>
+                        <a:rPr lang="en-US" sz="1000" b="0" i="0" u="none" strike="noStrike" dirty="0" smtClean="0">
+                          <a:solidFill>
+                            <a:srgbClr val="000000"/>
+                          </a:solidFill>
+                          <a:effectLst/>
+                          <a:latin typeface="Calibri"/>
+                        </a:rPr>
+                        <a:t>+ </a:t>
+                      </a:r>
+                      <a:r>
+                        <a:rPr lang="en-US" sz="1000" b="0" i="0" u="none" strike="noStrike" dirty="0">
+                          <a:solidFill>
+                            <a:srgbClr val="000000"/>
+                          </a:solidFill>
+                          <a:effectLst/>
+                          <a:latin typeface="Calibri"/>
+                        </a:rPr>
+                        <a:t>/ –</a:t>
+                      </a:r>
+                    </a:p>
+                  </a:txBody>
+                  <a:tcPr marL="9525" marR="9525" marT="9525" marB="0" anchor="ctr"/>
+                </a:tc>
+              </a:tr>
+              <a:tr h="211642">
+                <a:tc>
+                  <a:txBody>
+                    <a:bodyPr/>
+                    <a:lstStyle/>
+                    <a:p>
+                      <a:pPr algn="ctr" fontAlgn="ctr"/>
+                      <a:r>
+                        <a:rPr lang="en-US" sz="1000" b="1" i="0" u="none" strike="noStrike" dirty="0">
+                          <a:solidFill>
+                            <a:srgbClr val="000000"/>
+                          </a:solidFill>
+                          <a:effectLst/>
+                          <a:latin typeface="Calibri"/>
+                        </a:rPr>
+                        <a:t>Bubble plot (2D / 3D)</a:t>
+                      </a:r>
+                    </a:p>
+                  </a:txBody>
+                  <a:tcPr marL="9525" marR="9525" marT="9525" marB="0" anchor="ctr">
+                    <a:solidFill>
+                      <a:schemeClr val="accent1"/>
+                    </a:solidFill>
+                  </a:tcPr>
+                </a:tc>
+                <a:tc>
+                  <a:txBody>
+                    <a:bodyPr/>
+                    <a:lstStyle/>
+                    <a:p>
+                      <a:pPr algn="ctr" fontAlgn="ctr"/>
+                      <a:r>
+                        <a:rPr lang="en-US" sz="1000" b="0" i="0" u="none" strike="noStrike" dirty="0" smtClean="0">
+                          <a:solidFill>
+                            <a:srgbClr val="000000"/>
+                          </a:solidFill>
+                          <a:effectLst/>
+                          <a:latin typeface="Calibri"/>
+                        </a:rPr>
+                        <a:t>+ </a:t>
+                      </a:r>
+                      <a:r>
+                        <a:rPr lang="en-US" sz="1000" b="0" i="0" u="none" strike="noStrike" dirty="0">
+                          <a:solidFill>
+                            <a:srgbClr val="000000"/>
+                          </a:solidFill>
+                          <a:effectLst/>
+                          <a:latin typeface="Calibri"/>
+                        </a:rPr>
+                        <a:t>/ –</a:t>
+                      </a:r>
+                    </a:p>
+                  </a:txBody>
+                  <a:tcPr marL="9525" marR="9525" marT="9525" marB="0" anchor="ctr"/>
+                </a:tc>
+                <a:tc>
+                  <a:txBody>
+                    <a:bodyPr/>
+                    <a:lstStyle/>
+                    <a:p>
+                      <a:pPr algn="ctr" fontAlgn="ctr"/>
+                      <a:r>
+                        <a:rPr lang="en-US" sz="1100" b="0" i="0" u="none" strike="noStrike" dirty="0">
+                          <a:solidFill>
+                            <a:srgbClr val="000000"/>
+                          </a:solidFill>
+                          <a:effectLst/>
+                          <a:latin typeface="Calibri"/>
+                        </a:rPr>
+                        <a:t> </a:t>
+                      </a:r>
+                      <a:r>
+                        <a:rPr lang="en-US" sz="1100" b="0" i="0" u="none" strike="noStrike" dirty="0" smtClean="0">
+                          <a:solidFill>
+                            <a:srgbClr val="000000"/>
+                          </a:solidFill>
+                          <a:effectLst/>
+                          <a:latin typeface="+mn-lt"/>
+                        </a:rPr>
+                        <a:t>–</a:t>
+                      </a:r>
+                      <a:endParaRPr lang="en-US" sz="1100" b="0" i="0" u="none" strike="noStrike" dirty="0">
+                        <a:solidFill>
+                          <a:srgbClr val="000000"/>
+                        </a:solidFill>
+                        <a:effectLst/>
+                        <a:latin typeface="Calibri"/>
+                      </a:endParaRPr>
+                    </a:p>
+                  </a:txBody>
+                  <a:tcPr marL="9525" marR="9525" marT="9525" marB="0" anchor="ctr"/>
+                </a:tc>
+                <a:tc>
+                  <a:txBody>
+                    <a:bodyPr/>
+                    <a:lstStyle/>
+                    <a:p>
+                      <a:pPr algn="ctr" fontAlgn="ctr"/>
+                      <a:r>
+                        <a:rPr lang="en-US" sz="1000" b="0" i="0" u="none" strike="noStrike" dirty="0">
+                          <a:solidFill>
+                            <a:srgbClr val="000000"/>
+                          </a:solidFill>
+                          <a:effectLst/>
+                          <a:latin typeface="Calibri"/>
+                        </a:rPr>
+                        <a:t>– / –</a:t>
+                      </a:r>
+                    </a:p>
+                  </a:txBody>
+                  <a:tcPr marL="9525" marR="9525" marT="9525" marB="0" anchor="ctr"/>
+                </a:tc>
+              </a:tr>
+              <a:tr h="211642">
+                <a:tc>
+                  <a:txBody>
+                    <a:bodyPr/>
+                    <a:lstStyle/>
+                    <a:p>
+                      <a:pPr algn="ctr" fontAlgn="ctr"/>
+                      <a:r>
+                        <a:rPr lang="en-US" sz="1000" b="1" i="0" u="none" strike="noStrike" dirty="0">
+                          <a:solidFill>
+                            <a:srgbClr val="000000"/>
+                          </a:solidFill>
+                          <a:effectLst/>
+                          <a:latin typeface="Calibri"/>
+                        </a:rPr>
+                        <a:t>Radar plot</a:t>
+                      </a:r>
+                    </a:p>
+                  </a:txBody>
+                  <a:tcPr marL="9525" marR="9525" marT="9525" marB="0" anchor="ctr">
+                    <a:solidFill>
+                      <a:schemeClr val="accent1"/>
+                    </a:solidFill>
+                  </a:tcPr>
+                </a:tc>
+                <a:tc>
+                  <a:txBody>
+                    <a:bodyPr/>
+                    <a:lstStyle/>
+                    <a:p>
+                      <a:pPr algn="ctr" fontAlgn="ctr"/>
+                      <a:r>
+                        <a:rPr lang="en-US" sz="1000" b="0" i="0" u="none" strike="noStrike" dirty="0" smtClean="0">
+                          <a:solidFill>
+                            <a:srgbClr val="000000"/>
+                          </a:solidFill>
+                          <a:effectLst/>
+                          <a:latin typeface="Calibri"/>
+                        </a:rPr>
+                        <a:t>+</a:t>
+                      </a:r>
+                      <a:endParaRPr lang="en-US" sz="1000" b="0" i="0" u="none" strike="noStrike" dirty="0">
+                        <a:solidFill>
+                          <a:srgbClr val="000000"/>
+                        </a:solidFill>
+                        <a:effectLst/>
+                        <a:latin typeface="Calibri"/>
+                      </a:endParaRPr>
+                    </a:p>
+                  </a:txBody>
+                  <a:tcPr marL="9525" marR="9525" marT="9525" marB="0" anchor="ctr"/>
+                </a:tc>
+                <a:tc>
+                  <a:txBody>
+                    <a:bodyPr/>
+                    <a:lstStyle/>
+                    <a:p>
+                      <a:pPr algn="ctr" fontAlgn="ctr"/>
+                      <a:r>
+                        <a:rPr lang="en-US" sz="1000" b="0" i="0" u="none" strike="noStrike" dirty="0">
+                          <a:solidFill>
+                            <a:srgbClr val="000000"/>
+                          </a:solidFill>
+                          <a:effectLst/>
+                          <a:latin typeface="Calibri"/>
+                        </a:rPr>
+                        <a:t>–</a:t>
+                      </a:r>
+                    </a:p>
+                  </a:txBody>
+                  <a:tcPr marL="9525" marR="9525" marT="9525" marB="0" anchor="ctr"/>
+                </a:tc>
+                <a:tc>
+                  <a:txBody>
+                    <a:bodyPr/>
+                    <a:lstStyle/>
+                    <a:p>
+                      <a:pPr algn="ctr" fontAlgn="ctr"/>
+                      <a:r>
+                        <a:rPr lang="en-US" sz="1000" b="0" i="0" u="none" strike="noStrike" dirty="0">
+                          <a:solidFill>
+                            <a:srgbClr val="000000"/>
+                          </a:solidFill>
+                          <a:effectLst/>
+                          <a:latin typeface="Calibri"/>
+                        </a:rPr>
+                        <a:t>–</a:t>
+                      </a:r>
+                    </a:p>
+                  </a:txBody>
+                  <a:tcPr marL="9525" marR="9525" marT="9525" marB="0" anchor="ctr"/>
+                </a:tc>
+              </a:tr>
+              <a:tr h="211642">
+                <a:tc>
+                  <a:txBody>
+                    <a:bodyPr/>
+                    <a:lstStyle/>
+                    <a:p>
+                      <a:pPr algn="ctr" fontAlgn="ctr"/>
+                      <a:r>
+                        <a:rPr lang="en-US" sz="1000" b="1" i="0" u="none" strike="noStrike" dirty="0">
+                          <a:solidFill>
+                            <a:srgbClr val="000000"/>
+                          </a:solidFill>
+                          <a:effectLst/>
+                          <a:latin typeface="Calibri"/>
+                        </a:rPr>
+                        <a:t>Box plot</a:t>
+                      </a:r>
+                    </a:p>
+                  </a:txBody>
+                  <a:tcPr marL="9525" marR="9525" marT="9525" marB="0" anchor="ctr">
+                    <a:solidFill>
+                      <a:schemeClr val="accent1"/>
+                    </a:solidFill>
+                  </a:tcPr>
+                </a:tc>
+                <a:tc>
+                  <a:txBody>
+                    <a:bodyPr/>
+                    <a:lstStyle/>
+                    <a:p>
+                      <a:pPr algn="ctr" fontAlgn="ctr"/>
+                      <a:r>
+                        <a:rPr lang="en-US" sz="1000" b="0" i="0" u="none" strike="noStrike" dirty="0" smtClean="0">
+                          <a:solidFill>
+                            <a:srgbClr val="000000"/>
+                          </a:solidFill>
+                          <a:effectLst/>
+                          <a:latin typeface="+mn-lt"/>
+                        </a:rPr>
+                        <a:t>–</a:t>
+                      </a:r>
+                      <a:endParaRPr lang="en-US" sz="1000" b="0" i="0" u="none" strike="noStrike" dirty="0">
+                        <a:solidFill>
+                          <a:srgbClr val="000000"/>
+                        </a:solidFill>
+                        <a:effectLst/>
+                        <a:latin typeface="Calibri"/>
+                      </a:endParaRPr>
+                    </a:p>
+                  </a:txBody>
+                  <a:tcPr marL="9525" marR="9525" marT="9525" marB="0" anchor="ctr"/>
+                </a:tc>
+                <a:tc>
+                  <a:txBody>
+                    <a:bodyPr/>
+                    <a:lstStyle/>
+                    <a:p>
+                      <a:pPr algn="ctr" fontAlgn="ctr"/>
+                      <a:r>
+                        <a:rPr lang="en-US" sz="1000" b="0" i="0" u="none" strike="noStrike" dirty="0">
+                          <a:solidFill>
+                            <a:srgbClr val="000000"/>
+                          </a:solidFill>
+                          <a:effectLst/>
+                          <a:latin typeface="Calibri"/>
+                        </a:rPr>
+                        <a:t>–</a:t>
+                      </a:r>
+                    </a:p>
+                  </a:txBody>
+                  <a:tcPr marL="9525" marR="9525" marT="9525" marB="0" anchor="ctr"/>
+                </a:tc>
+                <a:tc>
+                  <a:txBody>
+                    <a:bodyPr/>
+                    <a:lstStyle/>
+                    <a:p>
+                      <a:pPr algn="ctr" fontAlgn="ctr"/>
+                      <a:r>
+                        <a:rPr lang="en-US" sz="1000" b="0" i="0" u="none" strike="noStrike" dirty="0">
+                          <a:solidFill>
+                            <a:srgbClr val="000000"/>
+                          </a:solidFill>
+                          <a:effectLst/>
+                          <a:latin typeface="Calibri"/>
+                        </a:rPr>
+                        <a:t>–</a:t>
+                      </a:r>
+                    </a:p>
+                  </a:txBody>
+                  <a:tcPr marL="9525" marR="9525" marT="9525" marB="0" anchor="ctr"/>
+                </a:tc>
+              </a:tr>
+              <a:tr h="211642">
+                <a:tc>
+                  <a:txBody>
+                    <a:bodyPr/>
+                    <a:lstStyle/>
+                    <a:p>
+                      <a:pPr algn="ctr" fontAlgn="ctr"/>
+                      <a:r>
+                        <a:rPr lang="en-US" sz="1000" b="1" i="0" u="none" strike="noStrike" dirty="0">
+                          <a:solidFill>
+                            <a:srgbClr val="000000"/>
+                          </a:solidFill>
+                          <a:effectLst/>
+                          <a:latin typeface="Calibri"/>
+                        </a:rPr>
+                        <a:t>Raster plot</a:t>
+                      </a:r>
+                    </a:p>
+                  </a:txBody>
+                  <a:tcPr marL="9525" marR="9525" marT="9525" marB="0" anchor="ctr">
+                    <a:solidFill>
+                      <a:schemeClr val="accent1"/>
+                    </a:solidFill>
+                  </a:tcPr>
+                </a:tc>
+                <a:tc>
+                  <a:txBody>
+                    <a:bodyPr/>
+                    <a:lstStyle/>
+                    <a:p>
+                      <a:pPr algn="ctr" fontAlgn="ctr"/>
+                      <a:r>
+                        <a:rPr lang="en-US" sz="1000" b="0" i="0" u="none" strike="noStrike" dirty="0" smtClean="0">
+                          <a:solidFill>
+                            <a:srgbClr val="000000"/>
+                          </a:solidFill>
+                          <a:effectLst/>
+                          <a:latin typeface="Calibri"/>
+                        </a:rPr>
+                        <a:t>+</a:t>
+                      </a:r>
+                      <a:endParaRPr lang="en-US" sz="1000" b="0" i="0" u="none" strike="noStrike" dirty="0">
+                        <a:solidFill>
+                          <a:srgbClr val="000000"/>
+                        </a:solidFill>
+                        <a:effectLst/>
+                        <a:latin typeface="Calibri"/>
+                      </a:endParaRPr>
+                    </a:p>
+                  </a:txBody>
+                  <a:tcPr marL="9525" marR="9525" marT="9525" marB="0" anchor="ctr"/>
+                </a:tc>
+                <a:tc>
+                  <a:txBody>
+                    <a:bodyPr/>
+                    <a:lstStyle/>
+                    <a:p>
+                      <a:pPr algn="ctr" fontAlgn="ctr"/>
+                      <a:r>
+                        <a:rPr lang="en-US" sz="1000" b="0" i="0" u="none" strike="noStrike" dirty="0">
+                          <a:solidFill>
+                            <a:srgbClr val="000000"/>
+                          </a:solidFill>
+                          <a:effectLst/>
+                          <a:latin typeface="Calibri"/>
+                        </a:rPr>
+                        <a:t>–</a:t>
+                      </a:r>
+                    </a:p>
+                  </a:txBody>
+                  <a:tcPr marL="9525" marR="9525" marT="9525" marB="0" anchor="ctr"/>
+                </a:tc>
+                <a:tc>
+                  <a:txBody>
+                    <a:bodyPr/>
+                    <a:lstStyle/>
+                    <a:p>
+                      <a:pPr algn="ctr" fontAlgn="ctr"/>
+                      <a:r>
+                        <a:rPr lang="en-US" sz="1000" b="0" i="0" u="none" strike="noStrike" dirty="0">
+                          <a:solidFill>
+                            <a:srgbClr val="000000"/>
+                          </a:solidFill>
+                          <a:effectLst/>
+                          <a:latin typeface="Calibri"/>
+                        </a:rPr>
+                        <a:t>–</a:t>
+                      </a:r>
+                    </a:p>
+                  </a:txBody>
+                  <a:tcPr marL="9525" marR="9525" marT="9525" marB="0" anchor="ctr"/>
+                </a:tc>
+              </a:tr>
+              <a:tr h="211642">
+                <a:tc>
+                  <a:txBody>
+                    <a:bodyPr/>
+                    <a:lstStyle/>
+                    <a:p>
+                      <a:pPr algn="ctr" fontAlgn="ctr"/>
+                      <a:r>
+                        <a:rPr lang="en-US" sz="1000" b="1" i="0" u="none" strike="noStrike" dirty="0">
+                          <a:solidFill>
+                            <a:srgbClr val="000000"/>
+                          </a:solidFill>
+                          <a:effectLst/>
+                          <a:latin typeface="Calibri"/>
+                        </a:rPr>
+                        <a:t>Contour plot</a:t>
+                      </a:r>
+                    </a:p>
+                  </a:txBody>
+                  <a:tcPr marL="9525" marR="9525" marT="9525" marB="0" anchor="ctr">
+                    <a:solidFill>
+                      <a:schemeClr val="accent1"/>
+                    </a:solidFill>
+                  </a:tcPr>
+                </a:tc>
+                <a:tc>
+                  <a:txBody>
+                    <a:bodyPr/>
+                    <a:lstStyle/>
+                    <a:p>
+                      <a:pPr algn="ctr" fontAlgn="ctr"/>
+                      <a:r>
+                        <a:rPr lang="en-US" sz="1000" b="0" i="0" u="none" strike="noStrike" dirty="0" smtClean="0">
+                          <a:solidFill>
+                            <a:srgbClr val="000000"/>
+                          </a:solidFill>
+                          <a:effectLst/>
+                          <a:latin typeface="Calibri"/>
+                        </a:rPr>
+                        <a:t>+</a:t>
+                      </a:r>
+                      <a:endParaRPr lang="en-US" sz="1000" b="0" i="0" u="none" strike="noStrike" dirty="0">
+                        <a:solidFill>
+                          <a:srgbClr val="000000"/>
+                        </a:solidFill>
+                        <a:effectLst/>
+                        <a:latin typeface="Calibri"/>
+                      </a:endParaRPr>
+                    </a:p>
+                  </a:txBody>
+                  <a:tcPr marL="9525" marR="9525" marT="9525" marB="0" anchor="ctr"/>
+                </a:tc>
+                <a:tc>
+                  <a:txBody>
+                    <a:bodyPr/>
+                    <a:lstStyle/>
+                    <a:p>
+                      <a:pPr algn="ctr" fontAlgn="ctr"/>
+                      <a:r>
+                        <a:rPr lang="en-US" sz="1000" b="0" i="0" u="none" strike="noStrike" dirty="0">
+                          <a:solidFill>
+                            <a:srgbClr val="000000"/>
+                          </a:solidFill>
+                          <a:effectLst/>
+                          <a:latin typeface="Calibri"/>
+                        </a:rPr>
+                        <a:t>–</a:t>
+                      </a:r>
+                    </a:p>
+                  </a:txBody>
+                  <a:tcPr marL="9525" marR="9525" marT="9525" marB="0" anchor="ctr"/>
+                </a:tc>
+                <a:tc>
+                  <a:txBody>
+                    <a:bodyPr/>
+                    <a:lstStyle/>
+                    <a:p>
+                      <a:pPr algn="ctr" fontAlgn="ctr"/>
+                      <a:r>
+                        <a:rPr lang="en-US" sz="1000" b="0" i="0" u="none" strike="noStrike" dirty="0">
+                          <a:solidFill>
+                            <a:srgbClr val="000000"/>
+                          </a:solidFill>
+                          <a:effectLst/>
+                          <a:latin typeface="Calibri"/>
+                        </a:rPr>
+                        <a:t>–</a:t>
+                      </a:r>
+                    </a:p>
+                  </a:txBody>
+                  <a:tcPr marL="9525" marR="9525" marT="9525" marB="0" anchor="ctr"/>
+                </a:tc>
+              </a:tr>
+              <a:tr h="211642">
+                <a:tc>
+                  <a:txBody>
+                    <a:bodyPr/>
+                    <a:lstStyle/>
+                    <a:p>
+                      <a:pPr algn="ctr" fontAlgn="ctr"/>
+                      <a:r>
+                        <a:rPr lang="en-US" sz="1000" b="1" i="0" u="none" strike="noStrike" dirty="0">
+                          <a:solidFill>
+                            <a:srgbClr val="000000"/>
+                          </a:solidFill>
+                          <a:effectLst/>
+                          <a:latin typeface="Calibri"/>
+                        </a:rPr>
+                        <a:t>Gauge plot</a:t>
+                      </a:r>
+                    </a:p>
+                  </a:txBody>
+                  <a:tcPr marL="9525" marR="9525" marT="9525" marB="0" anchor="ctr">
+                    <a:solidFill>
+                      <a:schemeClr val="accent1"/>
+                    </a:solidFill>
+                  </a:tcPr>
+                </a:tc>
+                <a:tc>
+                  <a:txBody>
+                    <a:bodyPr/>
+                    <a:lstStyle/>
+                    <a:p>
+                      <a:pPr algn="ctr" fontAlgn="ctr"/>
+                      <a:r>
+                        <a:rPr lang="en-US" sz="1000" b="0" i="0" u="none" strike="noStrike" dirty="0" smtClean="0">
+                          <a:solidFill>
+                            <a:srgbClr val="000000"/>
+                          </a:solidFill>
+                          <a:effectLst/>
+                          <a:latin typeface="Calibri"/>
+                        </a:rPr>
+                        <a:t>+</a:t>
+                      </a:r>
+                      <a:endParaRPr lang="en-US" sz="1000" b="0" i="0" u="none" strike="noStrike" dirty="0">
+                        <a:solidFill>
+                          <a:srgbClr val="000000"/>
+                        </a:solidFill>
+                        <a:effectLst/>
+                        <a:latin typeface="Calibri"/>
+                      </a:endParaRPr>
+                    </a:p>
+                  </a:txBody>
+                  <a:tcPr marL="9525" marR="9525" marT="9525" marB="0" anchor="ctr"/>
+                </a:tc>
+                <a:tc>
+                  <a:txBody>
+                    <a:bodyPr/>
+                    <a:lstStyle/>
+                    <a:p>
+                      <a:pPr algn="ctr" fontAlgn="ctr"/>
+                      <a:r>
+                        <a:rPr lang="en-US" sz="1000" b="0" i="0" u="none" strike="noStrike" dirty="0">
+                          <a:solidFill>
+                            <a:srgbClr val="000000"/>
+                          </a:solidFill>
+                          <a:effectLst/>
+                          <a:latin typeface="Calibri"/>
+                        </a:rPr>
+                        <a:t>–</a:t>
+                      </a:r>
+                    </a:p>
+                  </a:txBody>
+                  <a:tcPr marL="9525" marR="9525" marT="9525" marB="0" anchor="ctr"/>
+                </a:tc>
+                <a:tc>
+                  <a:txBody>
+                    <a:bodyPr/>
+                    <a:lstStyle/>
+                    <a:p>
+                      <a:pPr algn="ctr" fontAlgn="ctr"/>
+                      <a:r>
+                        <a:rPr lang="en-US" sz="1000" b="0" i="0" u="none" strike="noStrike" dirty="0">
+                          <a:solidFill>
+                            <a:srgbClr val="000000"/>
+                          </a:solidFill>
+                          <a:effectLst/>
+                          <a:latin typeface="Calibri"/>
+                        </a:rPr>
+                        <a:t>–</a:t>
+                      </a:r>
+                    </a:p>
+                  </a:txBody>
+                  <a:tcPr marL="9525" marR="9525" marT="9525" marB="0" anchor="ctr"/>
+                </a:tc>
+              </a:tr>
+              <a:tr h="211642">
+                <a:tc>
+                  <a:txBody>
+                    <a:bodyPr/>
+                    <a:lstStyle/>
+                    <a:p>
+                      <a:pPr algn="ctr" fontAlgn="ctr"/>
+                      <a:r>
+                        <a:rPr lang="en-US" sz="1000" b="1" i="0" u="none" strike="noStrike" dirty="0">
+                          <a:solidFill>
+                            <a:srgbClr val="000000"/>
+                          </a:solidFill>
+                          <a:effectLst/>
+                          <a:latin typeface="Calibri"/>
+                        </a:rPr>
+                        <a:t>Step plot</a:t>
+                      </a:r>
+                    </a:p>
+                  </a:txBody>
+                  <a:tcPr marL="9525" marR="9525" marT="9525" marB="0" anchor="ctr">
+                    <a:solidFill>
+                      <a:schemeClr val="accent1"/>
+                    </a:solidFill>
+                  </a:tcPr>
+                </a:tc>
+                <a:tc>
+                  <a:txBody>
+                    <a:bodyPr/>
+                    <a:lstStyle/>
+                    <a:p>
+                      <a:pPr algn="ctr" fontAlgn="ctr"/>
+                      <a:r>
+                        <a:rPr lang="en-US" sz="1000" b="0" i="0" u="none" strike="noStrike" dirty="0" smtClean="0">
+                          <a:solidFill>
+                            <a:srgbClr val="000000"/>
+                          </a:solidFill>
+                          <a:effectLst/>
+                          <a:latin typeface="Calibri"/>
+                        </a:rPr>
+                        <a:t>+</a:t>
+                      </a:r>
+                      <a:endParaRPr lang="en-US" sz="1000" b="0" i="0" u="none" strike="noStrike" dirty="0">
+                        <a:solidFill>
+                          <a:srgbClr val="000000"/>
+                        </a:solidFill>
+                        <a:effectLst/>
+                        <a:latin typeface="Calibri"/>
+                      </a:endParaRPr>
+                    </a:p>
+                  </a:txBody>
+                  <a:tcPr marL="9525" marR="9525" marT="9525" marB="0" anchor="ctr"/>
+                </a:tc>
+                <a:tc>
+                  <a:txBody>
+                    <a:bodyPr/>
+                    <a:lstStyle/>
+                    <a:p>
+                      <a:pPr algn="ctr" fontAlgn="ctr"/>
+                      <a:r>
+                        <a:rPr lang="en-US" sz="1000" b="0" i="0" u="none" strike="noStrike" dirty="0">
+                          <a:solidFill>
+                            <a:srgbClr val="000000"/>
+                          </a:solidFill>
+                          <a:effectLst/>
+                          <a:latin typeface="Calibri"/>
+                        </a:rPr>
+                        <a:t>–</a:t>
+                      </a:r>
+                    </a:p>
+                  </a:txBody>
+                  <a:tcPr marL="9525" marR="9525" marT="9525" marB="0" anchor="ctr"/>
+                </a:tc>
+                <a:tc>
+                  <a:txBody>
+                    <a:bodyPr/>
+                    <a:lstStyle/>
+                    <a:p>
+                      <a:pPr algn="ctr" fontAlgn="ctr"/>
+                      <a:r>
+                        <a:rPr lang="en-US" sz="1000" b="0" i="0" u="none" strike="noStrike" dirty="0">
+                          <a:solidFill>
+                            <a:srgbClr val="000000"/>
+                          </a:solidFill>
+                          <a:effectLst/>
+                          <a:latin typeface="Calibri"/>
+                        </a:rPr>
+                        <a:t>–</a:t>
+                      </a:r>
+                    </a:p>
+                  </a:txBody>
+                  <a:tcPr marL="9525" marR="9525" marT="9525" marB="0" anchor="ctr"/>
+                </a:tc>
+              </a:tr>
+              <a:tr h="211642">
+                <a:tc>
+                  <a:txBody>
+                    <a:bodyPr/>
+                    <a:lstStyle/>
+                    <a:p>
+                      <a:pPr algn="ctr" fontAlgn="ctr"/>
+                      <a:r>
+                        <a:rPr lang="en-US" sz="1000" b="1" i="0" u="none" strike="noStrike" dirty="0">
+                          <a:solidFill>
+                            <a:srgbClr val="000000"/>
+                          </a:solidFill>
+                          <a:effectLst/>
+                          <a:latin typeface="Calibri"/>
+                        </a:rPr>
+                        <a:t>Gantt plot</a:t>
+                      </a:r>
+                    </a:p>
+                  </a:txBody>
+                  <a:tcPr marL="9525" marR="9525" marT="9525" marB="0" anchor="ctr">
+                    <a:solidFill>
+                      <a:schemeClr val="accent1"/>
+                    </a:solidFill>
+                  </a:tcPr>
+                </a:tc>
+                <a:tc>
+                  <a:txBody>
+                    <a:bodyPr/>
+                    <a:lstStyle/>
+                    <a:p>
+                      <a:pPr algn="ctr" fontAlgn="ctr"/>
+                      <a:r>
+                        <a:rPr lang="en-US" sz="1000" b="0" i="0" u="none" strike="noStrike" dirty="0" smtClean="0">
+                          <a:solidFill>
+                            <a:srgbClr val="000000"/>
+                          </a:solidFill>
+                          <a:effectLst/>
+                          <a:latin typeface="Calibri"/>
+                        </a:rPr>
+                        <a:t>+</a:t>
+                      </a:r>
+                      <a:endParaRPr lang="en-US" sz="1000" b="0" i="0" u="none" strike="noStrike" dirty="0">
+                        <a:solidFill>
+                          <a:srgbClr val="000000"/>
+                        </a:solidFill>
+                        <a:effectLst/>
+                        <a:latin typeface="Calibri"/>
+                      </a:endParaRPr>
+                    </a:p>
+                  </a:txBody>
+                  <a:tcPr marL="9525" marR="9525" marT="9525" marB="0" anchor="ctr"/>
+                </a:tc>
+                <a:tc>
+                  <a:txBody>
+                    <a:bodyPr/>
+                    <a:lstStyle/>
+                    <a:p>
+                      <a:pPr algn="ctr" fontAlgn="ctr"/>
+                      <a:r>
+                        <a:rPr lang="en-US" sz="1000" b="0" i="0" u="none" strike="noStrike" dirty="0">
+                          <a:solidFill>
+                            <a:srgbClr val="000000"/>
+                          </a:solidFill>
+                          <a:effectLst/>
+                          <a:latin typeface="Calibri"/>
+                        </a:rPr>
+                        <a:t>–</a:t>
+                      </a:r>
+                    </a:p>
+                  </a:txBody>
+                  <a:tcPr marL="9525" marR="9525" marT="9525" marB="0" anchor="ctr"/>
+                </a:tc>
+                <a:tc>
+                  <a:txBody>
+                    <a:bodyPr/>
+                    <a:lstStyle/>
+                    <a:p>
+                      <a:pPr algn="ctr" fontAlgn="ctr"/>
+                      <a:r>
+                        <a:rPr lang="en-US" sz="1000" b="0" i="0" u="none" strike="noStrike" dirty="0">
+                          <a:solidFill>
+                            <a:srgbClr val="000000"/>
+                          </a:solidFill>
+                          <a:effectLst/>
+                          <a:latin typeface="Calibri"/>
+                        </a:rPr>
+                        <a:t>–</a:t>
+                      </a:r>
+                    </a:p>
+                  </a:txBody>
+                  <a:tcPr marL="9525" marR="9525" marT="9525" marB="0" anchor="ctr"/>
+                </a:tc>
+              </a:tr>
+              <a:tr h="211642">
+                <a:tc>
+                  <a:txBody>
+                    <a:bodyPr/>
+                    <a:lstStyle/>
+                    <a:p>
+                      <a:pPr algn="ctr" fontAlgn="ctr"/>
+                      <a:r>
+                        <a:rPr lang="en-US" sz="1000" b="1" i="0" u="none" strike="noStrike" dirty="0">
+                          <a:solidFill>
+                            <a:srgbClr val="000000"/>
+                          </a:solidFill>
+                          <a:effectLst/>
+                          <a:latin typeface="Calibri"/>
+                        </a:rPr>
+                        <a:t>Histogram</a:t>
+                      </a:r>
+                    </a:p>
+                  </a:txBody>
+                  <a:tcPr marL="9525" marR="9525" marT="9525" marB="0" anchor="ctr">
+                    <a:solidFill>
+                      <a:schemeClr val="accent1"/>
+                    </a:solidFill>
+                  </a:tcPr>
+                </a:tc>
+                <a:tc>
+                  <a:txBody>
+                    <a:bodyPr/>
+                    <a:lstStyle/>
+                    <a:p>
+                      <a:pPr algn="ctr" fontAlgn="ctr"/>
+                      <a:r>
+                        <a:rPr lang="en-US" sz="1000" b="0" i="0" u="none" strike="noStrike" dirty="0" smtClean="0">
+                          <a:solidFill>
+                            <a:srgbClr val="000000"/>
+                          </a:solidFill>
+                          <a:effectLst/>
+                          <a:latin typeface="Calibri"/>
+                        </a:rPr>
+                        <a:t>+</a:t>
+                      </a:r>
+                      <a:endParaRPr lang="en-US" sz="1000" b="0" i="0" u="none" strike="noStrike" dirty="0">
+                        <a:solidFill>
+                          <a:srgbClr val="000000"/>
+                        </a:solidFill>
+                        <a:effectLst/>
+                        <a:latin typeface="Calibri"/>
+                      </a:endParaRPr>
+                    </a:p>
+                  </a:txBody>
+                  <a:tcPr marL="9525" marR="9525" marT="9525" marB="0" anchor="ctr"/>
+                </a:tc>
+                <a:tc>
+                  <a:txBody>
+                    <a:bodyPr/>
+                    <a:lstStyle/>
+                    <a:p>
+                      <a:pPr algn="ctr" fontAlgn="ctr"/>
+                      <a:r>
+                        <a:rPr lang="en-US" sz="1000" b="0" i="0" u="none" strike="noStrike" dirty="0">
+                          <a:solidFill>
+                            <a:srgbClr val="000000"/>
+                          </a:solidFill>
+                          <a:effectLst/>
+                          <a:latin typeface="Calibri"/>
+                        </a:rPr>
+                        <a:t>–</a:t>
+                      </a:r>
+                    </a:p>
+                  </a:txBody>
+                  <a:tcPr marL="9525" marR="9525" marT="9525" marB="0" anchor="ctr"/>
+                </a:tc>
+                <a:tc>
+                  <a:txBody>
+                    <a:bodyPr/>
+                    <a:lstStyle/>
+                    <a:p>
+                      <a:pPr algn="ctr" fontAlgn="ctr"/>
+                      <a:r>
+                        <a:rPr lang="en-US" sz="1000" b="0" i="0" u="none" strike="noStrike" dirty="0">
+                          <a:solidFill>
+                            <a:srgbClr val="000000"/>
+                          </a:solidFill>
+                          <a:effectLst/>
+                          <a:latin typeface="Calibri"/>
+                        </a:rPr>
+                        <a:t>–</a:t>
+                      </a:r>
+                    </a:p>
+                  </a:txBody>
+                  <a:tcPr marL="9525" marR="9525" marT="9525" marB="0" anchor="ctr"/>
+                </a:tc>
+              </a:tr>
+              <a:tr h="211642">
+                <a:tc>
+                  <a:txBody>
+                    <a:bodyPr/>
+                    <a:lstStyle/>
+                    <a:p>
+                      <a:pPr algn="ctr" fontAlgn="ctr"/>
+                      <a:r>
+                        <a:rPr lang="en-US" sz="1000" b="1" i="0" u="none" strike="noStrike" dirty="0">
+                          <a:solidFill>
+                            <a:srgbClr val="000000"/>
+                          </a:solidFill>
+                          <a:effectLst/>
+                          <a:latin typeface="Calibri"/>
+                        </a:rPr>
+                        <a:t>Multiple axes</a:t>
+                      </a:r>
+                    </a:p>
+                  </a:txBody>
+                  <a:tcPr marL="9525" marR="9525" marT="9525" marB="0" anchor="ctr">
+                    <a:solidFill>
+                      <a:schemeClr val="accent1"/>
+                    </a:solidFill>
+                  </a:tcPr>
+                </a:tc>
+                <a:tc>
+                  <a:txBody>
+                    <a:bodyPr/>
+                    <a:lstStyle/>
+                    <a:p>
+                      <a:pPr algn="ctr" fontAlgn="ctr"/>
+                      <a:r>
+                        <a:rPr lang="en-US" sz="1000" b="0" i="0" u="none" strike="noStrike" dirty="0" smtClean="0">
+                          <a:solidFill>
+                            <a:srgbClr val="000000"/>
+                          </a:solidFill>
+                          <a:effectLst/>
+                          <a:latin typeface="Calibri"/>
+                        </a:rPr>
+                        <a:t>+</a:t>
+                      </a:r>
+                      <a:endParaRPr lang="en-US" sz="1000" b="0" i="0" u="none" strike="noStrike" dirty="0">
+                        <a:solidFill>
+                          <a:srgbClr val="000000"/>
+                        </a:solidFill>
+                        <a:effectLst/>
+                        <a:latin typeface="Calibri"/>
+                      </a:endParaRPr>
+                    </a:p>
+                  </a:txBody>
+                  <a:tcPr marL="9525" marR="9525" marT="9525" marB="0" anchor="ctr"/>
+                </a:tc>
+                <a:tc>
+                  <a:txBody>
+                    <a:bodyPr/>
+                    <a:lstStyle/>
+                    <a:p>
+                      <a:pPr algn="ctr" fontAlgn="ctr"/>
+                      <a:r>
+                        <a:rPr lang="en-US" sz="1000" b="0" i="0" u="none" strike="noStrike" dirty="0" smtClean="0">
+                          <a:solidFill>
+                            <a:srgbClr val="000000"/>
+                          </a:solidFill>
+                          <a:effectLst/>
+                          <a:latin typeface="Calibri"/>
+                        </a:rPr>
+                        <a:t>+</a:t>
+                      </a:r>
+                      <a:endParaRPr lang="en-US" sz="1000" b="0" i="0" u="none" strike="noStrike" dirty="0">
+                        <a:solidFill>
+                          <a:srgbClr val="000000"/>
+                        </a:solidFill>
+                        <a:effectLst/>
+                        <a:latin typeface="Calibri"/>
+                      </a:endParaRPr>
+                    </a:p>
+                  </a:txBody>
+                  <a:tcPr marL="9525" marR="9525" marT="9525" marB="0" anchor="ctr"/>
+                </a:tc>
+                <a:tc>
+                  <a:txBody>
+                    <a:bodyPr/>
+                    <a:lstStyle/>
+                    <a:p>
+                      <a:pPr algn="ctr" fontAlgn="ctr"/>
+                      <a:r>
+                        <a:rPr lang="en-US" sz="1000" b="0" i="0" u="none" strike="noStrike" dirty="0">
+                          <a:solidFill>
+                            <a:srgbClr val="000000"/>
+                          </a:solidFill>
+                          <a:effectLst/>
+                          <a:latin typeface="Calibri"/>
+                        </a:rPr>
+                        <a:t>–</a:t>
+                      </a:r>
+                    </a:p>
+                  </a:txBody>
+                  <a:tcPr marL="9525" marR="9525" marT="9525" marB="0" anchor="ctr"/>
+                </a:tc>
+              </a:tr>
+              <a:tr h="211642">
+                <a:tc>
+                  <a:txBody>
+                    <a:bodyPr/>
+                    <a:lstStyle/>
+                    <a:p>
+                      <a:pPr algn="ctr" fontAlgn="ctr"/>
+                      <a:r>
+                        <a:rPr lang="en-US" sz="1000" b="1" i="0" u="none" strike="noStrike" dirty="0">
+                          <a:solidFill>
+                            <a:srgbClr val="000000"/>
+                          </a:solidFill>
+                          <a:effectLst/>
+                          <a:latin typeface="Calibri"/>
+                        </a:rPr>
+                        <a:t>Logarithmic axes</a:t>
+                      </a:r>
+                    </a:p>
+                  </a:txBody>
+                  <a:tcPr marL="9525" marR="9525" marT="9525" marB="0" anchor="ctr">
+                    <a:solidFill>
+                      <a:schemeClr val="accent1"/>
+                    </a:solidFill>
+                  </a:tcPr>
+                </a:tc>
+                <a:tc>
+                  <a:txBody>
+                    <a:bodyPr/>
+                    <a:lstStyle/>
+                    <a:p>
+                      <a:pPr algn="ctr" fontAlgn="ctr"/>
+                      <a:r>
+                        <a:rPr lang="en-US" sz="1000" b="0" i="0" u="none" strike="noStrike" dirty="0" smtClean="0">
+                          <a:solidFill>
+                            <a:srgbClr val="000000"/>
+                          </a:solidFill>
+                          <a:effectLst/>
+                          <a:latin typeface="Calibri"/>
+                        </a:rPr>
+                        <a:t>+</a:t>
+                      </a:r>
+                      <a:endParaRPr lang="en-US" sz="1000" b="0" i="0" u="none" strike="noStrike" dirty="0">
+                        <a:solidFill>
+                          <a:srgbClr val="000000"/>
+                        </a:solidFill>
+                        <a:effectLst/>
+                        <a:latin typeface="Calibri"/>
+                      </a:endParaRPr>
+                    </a:p>
+                  </a:txBody>
+                  <a:tcPr marL="9525" marR="9525" marT="9525" marB="0" anchor="ctr"/>
+                </a:tc>
+                <a:tc>
+                  <a:txBody>
+                    <a:bodyPr/>
+                    <a:lstStyle/>
+                    <a:p>
+                      <a:pPr algn="ctr" fontAlgn="ctr"/>
+                      <a:r>
+                        <a:rPr lang="en-US" sz="1000" b="0" i="0" u="none" strike="noStrike" dirty="0" smtClean="0">
+                          <a:solidFill>
+                            <a:srgbClr val="000000"/>
+                          </a:solidFill>
+                          <a:effectLst/>
+                          <a:latin typeface="Calibri"/>
+                        </a:rPr>
+                        <a:t>+</a:t>
+                      </a:r>
+                      <a:endParaRPr lang="en-US" sz="1000" b="0" i="0" u="none" strike="noStrike" dirty="0">
+                        <a:solidFill>
+                          <a:srgbClr val="000000"/>
+                        </a:solidFill>
+                        <a:effectLst/>
+                        <a:latin typeface="Calibri"/>
+                      </a:endParaRPr>
+                    </a:p>
+                  </a:txBody>
+                  <a:tcPr marL="9525" marR="9525" marT="9525" marB="0" anchor="ctr"/>
+                </a:tc>
+                <a:tc>
+                  <a:txBody>
+                    <a:bodyPr/>
+                    <a:lstStyle/>
+                    <a:p>
+                      <a:pPr algn="ctr" fontAlgn="ctr"/>
+                      <a:r>
+                        <a:rPr lang="en-US" sz="1000" b="0" i="0" u="none" strike="noStrike" dirty="0" smtClean="0">
+                          <a:solidFill>
+                            <a:srgbClr val="000000"/>
+                          </a:solidFill>
+                          <a:effectLst/>
+                          <a:latin typeface="Calibri"/>
+                        </a:rPr>
+                        <a:t>+</a:t>
+                      </a:r>
+                      <a:endParaRPr lang="en-US" sz="1000" b="0" i="0" u="none" strike="noStrike" dirty="0">
+                        <a:solidFill>
+                          <a:srgbClr val="000000"/>
+                        </a:solidFill>
+                        <a:effectLst/>
+                        <a:latin typeface="Calibri"/>
+                      </a:endParaRPr>
+                    </a:p>
+                  </a:txBody>
+                  <a:tcPr marL="9525" marR="9525" marT="9525" marB="0" anchor="ctr"/>
+                </a:tc>
+              </a:tr>
+              <a:tr h="423284">
+                <a:tc>
+                  <a:txBody>
+                    <a:bodyPr/>
+                    <a:lstStyle/>
+                    <a:p>
+                      <a:pPr algn="ctr" fontAlgn="ctr"/>
+                      <a:r>
+                        <a:rPr lang="en-US" sz="1000" b="1" i="0" u="none" strike="noStrike" dirty="0">
+                          <a:solidFill>
+                            <a:srgbClr val="000000"/>
+                          </a:solidFill>
+                          <a:effectLst/>
+                          <a:latin typeface="Calibri"/>
+                        </a:rPr>
+                        <a:t>Line smoothing</a:t>
+                      </a:r>
+                    </a:p>
+                  </a:txBody>
+                  <a:tcPr marL="9525" marR="9525" marT="9525" marB="0" anchor="ctr">
+                    <a:solidFill>
+                      <a:schemeClr val="accent1"/>
+                    </a:solidFill>
+                  </a:tcPr>
+                </a:tc>
+                <a:tc>
+                  <a:txBody>
+                    <a:bodyPr/>
+                    <a:lstStyle/>
+                    <a:p>
+                      <a:pPr algn="ctr" fontAlgn="ctr"/>
+                      <a:r>
+                        <a:rPr lang="en-US" sz="1000" b="0" i="0" u="none" strike="noStrike" dirty="0" smtClean="0">
+                          <a:solidFill>
+                            <a:srgbClr val="000000"/>
+                          </a:solidFill>
+                          <a:effectLst/>
+                          <a:latin typeface="Calibri"/>
+                        </a:rPr>
+                        <a:t>(</a:t>
+                      </a:r>
+                      <a:r>
+                        <a:rPr lang="en-US" sz="1000" b="0" i="0" u="none" strike="noStrike" dirty="0">
+                          <a:solidFill>
+                            <a:srgbClr val="000000"/>
+                          </a:solidFill>
+                          <a:effectLst/>
+                          <a:latin typeface="Calibri"/>
+                        </a:rPr>
+                        <a:t>experimental)</a:t>
+                      </a:r>
+                    </a:p>
+                  </a:txBody>
+                  <a:tcPr marL="9525" marR="9525" marT="9525" marB="0" anchor="ctr"/>
+                </a:tc>
+                <a:tc>
+                  <a:txBody>
+                    <a:bodyPr/>
+                    <a:lstStyle/>
+                    <a:p>
+                      <a:pPr algn="ctr" fontAlgn="ctr"/>
+                      <a:r>
+                        <a:rPr lang="en-US" sz="1100" b="0" i="0" u="none" strike="noStrike" dirty="0">
+                          <a:solidFill>
+                            <a:srgbClr val="000000"/>
+                          </a:solidFill>
+                          <a:effectLst/>
+                          <a:latin typeface="Calibri"/>
+                        </a:rPr>
+                        <a:t> </a:t>
+                      </a:r>
+                      <a:r>
+                        <a:rPr lang="en-US" sz="1100" b="0" i="0" u="none" strike="noStrike" dirty="0" smtClean="0">
+                          <a:solidFill>
+                            <a:srgbClr val="000000"/>
+                          </a:solidFill>
+                          <a:effectLst/>
+                          <a:latin typeface="+mn-lt"/>
+                        </a:rPr>
+                        <a:t>–</a:t>
+                      </a:r>
+                      <a:endParaRPr lang="en-US" sz="1100" b="0" i="0" u="none" strike="noStrike" dirty="0">
+                        <a:solidFill>
+                          <a:srgbClr val="000000"/>
+                        </a:solidFill>
+                        <a:effectLst/>
+                        <a:latin typeface="Calibri"/>
+                      </a:endParaRPr>
+                    </a:p>
+                  </a:txBody>
+                  <a:tcPr marL="9525" marR="9525" marT="9525" marB="0" anchor="ctr"/>
+                </a:tc>
+                <a:tc>
+                  <a:txBody>
+                    <a:bodyPr/>
+                    <a:lstStyle/>
+                    <a:p>
+                      <a:pPr algn="ctr" fontAlgn="ctr"/>
+                      <a:r>
+                        <a:rPr lang="en-US" sz="1000" b="0" i="0" u="none" strike="noStrike" dirty="0">
+                          <a:solidFill>
+                            <a:srgbClr val="000000"/>
+                          </a:solidFill>
+                          <a:effectLst/>
+                          <a:latin typeface="Calibri"/>
+                        </a:rPr>
+                        <a:t>–</a:t>
+                      </a:r>
+                    </a:p>
+                  </a:txBody>
+                  <a:tcPr marL="9525" marR="9525" marT="9525" marB="0" anchor="ctr"/>
+                </a:tc>
+              </a:tr>
+            </a:tbl>
+          </a:graphicData>
+        </a:graphic>
+      </p:graphicFrame>
+    </p:spTree>
+    <p:extLst>
+      <p:ext uri="{BB962C8B-B14F-4D97-AF65-F5344CB8AC3E}">
+        <p14:creationId xmlns:p14="http://schemas.microsoft.com/office/powerpoint/2010/main" val="4157284228"/>
+      </p:ext>
+    </p:extLst>
+  </p:cSld>
+  <p:clrMapOvr>
+    <a:masterClrMapping/>
+  </p:clrMapOvr>
+</p:sld>
+</file>
+
 <file path=ppt/theme/theme1.xml><?xml version="1.0" encoding="utf-8"?>
 <a:theme xmlns:a="http://schemas.openxmlformats.org/drawingml/2006/main" name="Tema de Office">
   <a:themeElements>

</xml_diff>